<commit_message>
Fixing demo for hawaii group
</commit_message>
<xml_diff>
--- a/HawaiiCFUG - APIs.pptx
+++ b/HawaiiCFUG - APIs.pptx
@@ -8,30 +8,34 @@
     <p:sldId id="256" r:id="rId2"/>
     <p:sldId id="258" r:id="rId3"/>
     <p:sldId id="259" r:id="rId4"/>
-    <p:sldId id="260" r:id="rId5"/>
-    <p:sldId id="261" r:id="rId6"/>
-    <p:sldId id="262" r:id="rId7"/>
-    <p:sldId id="263" r:id="rId8"/>
-    <p:sldId id="264" r:id="rId9"/>
-    <p:sldId id="265" r:id="rId10"/>
-    <p:sldId id="266" r:id="rId11"/>
-    <p:sldId id="268" r:id="rId12"/>
-    <p:sldId id="267" r:id="rId13"/>
-    <p:sldId id="269" r:id="rId14"/>
-    <p:sldId id="270" r:id="rId15"/>
-    <p:sldId id="271" r:id="rId16"/>
-    <p:sldId id="272" r:id="rId17"/>
-    <p:sldId id="273" r:id="rId18"/>
-    <p:sldId id="274" r:id="rId19"/>
-    <p:sldId id="275" r:id="rId20"/>
-    <p:sldId id="276" r:id="rId21"/>
-    <p:sldId id="277" r:id="rId22"/>
-    <p:sldId id="278" r:id="rId23"/>
-    <p:sldId id="279" r:id="rId24"/>
-    <p:sldId id="280" r:id="rId25"/>
-    <p:sldId id="281" r:id="rId26"/>
-    <p:sldId id="282" r:id="rId27"/>
-    <p:sldId id="285" r:id="rId28"/>
+    <p:sldId id="289" r:id="rId5"/>
+    <p:sldId id="286" r:id="rId6"/>
+    <p:sldId id="287" r:id="rId7"/>
+    <p:sldId id="288" r:id="rId8"/>
+    <p:sldId id="260" r:id="rId9"/>
+    <p:sldId id="261" r:id="rId10"/>
+    <p:sldId id="262" r:id="rId11"/>
+    <p:sldId id="263" r:id="rId12"/>
+    <p:sldId id="264" r:id="rId13"/>
+    <p:sldId id="265" r:id="rId14"/>
+    <p:sldId id="266" r:id="rId15"/>
+    <p:sldId id="268" r:id="rId16"/>
+    <p:sldId id="267" r:id="rId17"/>
+    <p:sldId id="269" r:id="rId18"/>
+    <p:sldId id="270" r:id="rId19"/>
+    <p:sldId id="271" r:id="rId20"/>
+    <p:sldId id="272" r:id="rId21"/>
+    <p:sldId id="273" r:id="rId22"/>
+    <p:sldId id="274" r:id="rId23"/>
+    <p:sldId id="275" r:id="rId24"/>
+    <p:sldId id="276" r:id="rId25"/>
+    <p:sldId id="277" r:id="rId26"/>
+    <p:sldId id="278" r:id="rId27"/>
+    <p:sldId id="279" r:id="rId28"/>
+    <p:sldId id="280" r:id="rId29"/>
+    <p:sldId id="281" r:id="rId30"/>
+    <p:sldId id="282" r:id="rId31"/>
+    <p:sldId id="285" r:id="rId32"/>
   </p:sldIdLst>
   <p:sldSz cx="12192000" cy="6858000"/>
   <p:notesSz cx="6858000" cy="9144000"/>
@@ -1205,7 +1209,7 @@
           <a:p>
             <a:fld id="{7B268192-F4A8-45E6-A8AD-C84EF33EB0C9}" type="datetimeFigureOut">
               <a:rPr lang="en-US" smtClean="0"/>
-              <a:t>1/19/2023</a:t>
+              <a:t>1/20/2023</a:t>
             </a:fld>
             <a:endParaRPr lang="en-US"/>
           </a:p>
@@ -1373,7 +1377,7 @@
           <a:p>
             <a:fld id="{7B268192-F4A8-45E6-A8AD-C84EF33EB0C9}" type="datetimeFigureOut">
               <a:rPr lang="en-US" smtClean="0"/>
-              <a:t>1/19/2023</a:t>
+              <a:t>1/20/2023</a:t>
             </a:fld>
             <a:endParaRPr lang="en-US"/>
           </a:p>
@@ -1486,7 +1490,7 @@
           <a:p>
             <a:fld id="{7B268192-F4A8-45E6-A8AD-C84EF33EB0C9}" type="datetimeFigureOut">
               <a:rPr lang="en-US" smtClean="0"/>
-              <a:t>1/19/2023</a:t>
+              <a:t>1/20/2023</a:t>
             </a:fld>
             <a:endParaRPr lang="en-US"/>
           </a:p>
@@ -1797,7 +1801,7 @@
           <a:p>
             <a:fld id="{7B268192-F4A8-45E6-A8AD-C84EF33EB0C9}" type="datetimeFigureOut">
               <a:rPr lang="en-US" smtClean="0"/>
-              <a:t>1/19/2023</a:t>
+              <a:t>1/20/2023</a:t>
             </a:fld>
             <a:endParaRPr lang="en-US"/>
           </a:p>
@@ -2088,7 +2092,7 @@
           <a:p>
             <a:fld id="{7B268192-F4A8-45E6-A8AD-C84EF33EB0C9}" type="datetimeFigureOut">
               <a:rPr lang="en-US" smtClean="0"/>
-              <a:t>1/19/2023</a:t>
+              <a:t>1/20/2023</a:t>
             </a:fld>
             <a:endParaRPr lang="en-US"/>
           </a:p>
@@ -2329,7 +2333,7 @@
           <a:p>
             <a:fld id="{7B268192-F4A8-45E6-A8AD-C84EF33EB0C9}" type="datetimeFigureOut">
               <a:rPr lang="en-US" smtClean="0"/>
-              <a:t>1/19/2023</a:t>
+              <a:t>1/20/2023</a:t>
             </a:fld>
             <a:endParaRPr lang="en-US"/>
           </a:p>
@@ -2855,6 +2859,601 @@
           <p:cNvPr id="2" name="Title 1">
             <a:extLst>
               <a:ext uri="{FF2B5EF4-FFF2-40B4-BE49-F238E27FC236}">
+                <a16:creationId xmlns:a16="http://schemas.microsoft.com/office/drawing/2014/main" id="{A1D15F9A-8216-226D-DD45-362B470A78E0}"/>
+              </a:ext>
+            </a:extLst>
+          </p:cNvPr>
+          <p:cNvSpPr>
+            <a:spLocks noGrp="1"/>
+          </p:cNvSpPr>
+          <p:nvPr>
+            <p:ph type="title"/>
+          </p:nvPr>
+        </p:nvSpPr>
+        <p:spPr/>
+        <p:txBody>
+          <a:bodyPr/>
+          <a:lstStyle/>
+          <a:p>
+            <a:endParaRPr lang="en-US"/>
+          </a:p>
+        </p:txBody>
+      </p:sp>
+      <p:sp>
+        <p:nvSpPr>
+          <p:cNvPr id="3" name="Content Placeholder 2">
+            <a:extLst>
+              <a:ext uri="{FF2B5EF4-FFF2-40B4-BE49-F238E27FC236}">
+                <a16:creationId xmlns:a16="http://schemas.microsoft.com/office/drawing/2014/main" id="{F7A42A19-0EC2-A033-CEF8-DB644D343C2E}"/>
+              </a:ext>
+            </a:extLst>
+          </p:cNvPr>
+          <p:cNvSpPr>
+            <a:spLocks noGrp="1"/>
+          </p:cNvSpPr>
+          <p:nvPr>
+            <p:ph idx="1"/>
+          </p:nvPr>
+        </p:nvSpPr>
+        <p:spPr/>
+        <p:txBody>
+          <a:bodyPr/>
+          <a:lstStyle/>
+          <a:p>
+            <a:endParaRPr lang="en-US" dirty="0"/>
+          </a:p>
+          <a:p>
+            <a:endParaRPr lang="en-US" dirty="0"/>
+          </a:p>
+          <a:p>
+            <a:r>
+              <a:rPr lang="en-US" dirty="0"/>
+              <a:t>METHOD = GET</a:t>
+            </a:r>
+          </a:p>
+          <a:p>
+            <a:endParaRPr lang="en-US" dirty="0"/>
+          </a:p>
+          <a:p>
+            <a:endParaRPr lang="en-US" dirty="0"/>
+          </a:p>
+          <a:p>
+            <a:endParaRPr lang="en-US" dirty="0"/>
+          </a:p>
+          <a:p>
+            <a:r>
+              <a:rPr lang="en-US" dirty="0"/>
+              <a:t>Headers : </a:t>
+            </a:r>
+            <a:br>
+              <a:rPr lang="en-US" dirty="0"/>
+            </a:br>
+            <a:r>
+              <a:rPr lang="en-US" dirty="0"/>
+              <a:t>    ACCEPT : text/html</a:t>
+            </a:r>
+            <a:br>
+              <a:rPr lang="en-US" dirty="0"/>
+            </a:br>
+            <a:r>
+              <a:rPr lang="en-US" dirty="0"/>
+              <a:t>    Authentication-token :  Bearer : abc:123</a:t>
+            </a:r>
+          </a:p>
+          <a:p>
+            <a:endParaRPr lang="en-US" dirty="0"/>
+          </a:p>
+        </p:txBody>
+      </p:sp>
+      <p:sp>
+        <p:nvSpPr>
+          <p:cNvPr id="4" name="Rectangle 3">
+            <a:extLst>
+              <a:ext uri="{FF2B5EF4-FFF2-40B4-BE49-F238E27FC236}">
+                <a16:creationId xmlns:a16="http://schemas.microsoft.com/office/drawing/2014/main" id="{8A268F85-86C5-F0C0-0A4C-710A3CDE18B1}"/>
+              </a:ext>
+            </a:extLst>
+          </p:cNvPr>
+          <p:cNvSpPr/>
+          <p:nvPr/>
+        </p:nvSpPr>
+        <p:spPr>
+          <a:xfrm>
+            <a:off x="173124" y="2967335"/>
+            <a:ext cx="10627397" cy="923330"/>
+          </a:xfrm>
+          <a:prstGeom prst="rect">
+            <a:avLst/>
+          </a:prstGeom>
+          <a:noFill/>
+        </p:spPr>
+        <p:txBody>
+          <a:bodyPr wrap="none" lIns="91440" tIns="45720" rIns="91440" bIns="45720">
+            <a:spAutoFit/>
+          </a:bodyPr>
+          <a:lstStyle/>
+          <a:p>
+            <a:pPr algn="ctr"/>
+            <a:r>
+              <a:rPr lang="en-US" sz="5400" b="1" cap="none" spc="0" dirty="0">
+                <a:ln w="12700">
+                  <a:solidFill>
+                    <a:schemeClr val="tx2">
+                      <a:lumMod val="75000"/>
+                    </a:schemeClr>
+                  </a:solidFill>
+                  <a:prstDash val="solid"/>
+                </a:ln>
+                <a:pattFill prst="dkUpDiag">
+                  <a:fgClr>
+                    <a:schemeClr val="tx2"/>
+                  </a:fgClr>
+                  <a:bgClr>
+                    <a:schemeClr val="tx2">
+                      <a:lumMod val="20000"/>
+                      <a:lumOff val="80000"/>
+                    </a:schemeClr>
+                  </a:bgClr>
+                </a:pattFill>
+                <a:effectLst>
+                  <a:outerShdw dist="38100" dir="2640000" algn="bl" rotWithShape="0">
+                    <a:schemeClr val="tx2">
+                      <a:lumMod val="75000"/>
+                    </a:schemeClr>
+                  </a:outerShdw>
+                </a:effectLst>
+              </a:rPr>
+              <a:t>http://server/application/endpoint/</a:t>
+            </a:r>
+          </a:p>
+        </p:txBody>
+      </p:sp>
+    </p:spTree>
+    <p:extLst>
+      <p:ext uri="{BB962C8B-B14F-4D97-AF65-F5344CB8AC3E}">
+        <p14:creationId xmlns:p14="http://schemas.microsoft.com/office/powerpoint/2010/main" val="95246152"/>
+      </p:ext>
+    </p:extLst>
+  </p:cSld>
+  <p:clrMapOvr>
+    <a:masterClrMapping/>
+  </p:clrMapOvr>
+</p:sld>
+</file>
+
+<file path=ppt/slides/slide11.xml><?xml version="1.0" encoding="utf-8"?>
+<p:sld xmlns:a="http://schemas.openxmlformats.org/drawingml/2006/main" xmlns:r="http://schemas.openxmlformats.org/officeDocument/2006/relationships" xmlns:p="http://schemas.openxmlformats.org/presentationml/2006/main">
+  <p:cSld>
+    <p:spTree>
+      <p:nvGrpSpPr>
+        <p:cNvPr id="1" name=""/>
+        <p:cNvGrpSpPr/>
+        <p:nvPr/>
+      </p:nvGrpSpPr>
+      <p:grpSpPr>
+        <a:xfrm>
+          <a:off x="0" y="0"/>
+          <a:ext cx="0" cy="0"/>
+          <a:chOff x="0" y="0"/>
+          <a:chExt cx="0" cy="0"/>
+        </a:xfrm>
+      </p:grpSpPr>
+      <p:sp>
+        <p:nvSpPr>
+          <p:cNvPr id="2" name="Title 1">
+            <a:extLst>
+              <a:ext uri="{FF2B5EF4-FFF2-40B4-BE49-F238E27FC236}">
+                <a16:creationId xmlns:a16="http://schemas.microsoft.com/office/drawing/2014/main" id="{B4BEE435-2C31-982A-AFB1-21754A447B89}"/>
+              </a:ext>
+            </a:extLst>
+          </p:cNvPr>
+          <p:cNvSpPr>
+            <a:spLocks noGrp="1"/>
+          </p:cNvSpPr>
+          <p:nvPr>
+            <p:ph type="title"/>
+          </p:nvPr>
+        </p:nvSpPr>
+        <p:spPr/>
+        <p:txBody>
+          <a:bodyPr/>
+          <a:lstStyle/>
+          <a:p>
+            <a:r>
+              <a:rPr lang="en-US" dirty="0"/>
+              <a:t>REST</a:t>
+            </a:r>
+          </a:p>
+        </p:txBody>
+      </p:sp>
+      <p:sp>
+        <p:nvSpPr>
+          <p:cNvPr id="3" name="Content Placeholder 2">
+            <a:extLst>
+              <a:ext uri="{FF2B5EF4-FFF2-40B4-BE49-F238E27FC236}">
+                <a16:creationId xmlns:a16="http://schemas.microsoft.com/office/drawing/2014/main" id="{4EBF1DCE-9302-5595-8535-FEA64D18126E}"/>
+              </a:ext>
+            </a:extLst>
+          </p:cNvPr>
+          <p:cNvSpPr>
+            <a:spLocks noGrp="1"/>
+          </p:cNvSpPr>
+          <p:nvPr>
+            <p:ph idx="1"/>
+          </p:nvPr>
+        </p:nvSpPr>
+        <p:spPr/>
+        <p:txBody>
+          <a:bodyPr/>
+          <a:lstStyle/>
+          <a:p>
+            <a:r>
+              <a:rPr lang="en-US" dirty="0"/>
+              <a:t>In the ColdFusion world, there are a few ways to create these API endpoints :</a:t>
+            </a:r>
+          </a:p>
+          <a:p>
+            <a:endParaRPr lang="en-US" dirty="0"/>
+          </a:p>
+          <a:p>
+            <a:pPr lvl="1"/>
+            <a:r>
+              <a:rPr lang="en-US" dirty="0"/>
+              <a:t>Creating REST CFCs in ACF/</a:t>
+            </a:r>
+            <a:r>
+              <a:rPr lang="en-US" dirty="0" err="1"/>
+              <a:t>Lucee</a:t>
+            </a:r>
+            <a:r>
+              <a:rPr lang="en-US" dirty="0"/>
+              <a:t> to process data.</a:t>
+            </a:r>
+          </a:p>
+          <a:p>
+            <a:pPr lvl="2"/>
+            <a:r>
+              <a:rPr lang="en-US" dirty="0"/>
+              <a:t>Raw functionality.  You will need to own your own auth, rate limiting, etc.</a:t>
+            </a:r>
+          </a:p>
+          <a:p>
+            <a:pPr lvl="1"/>
+            <a:r>
+              <a:rPr lang="en-US" dirty="0"/>
+              <a:t>Using a framework like Taffy.io to develop your APIs</a:t>
+            </a:r>
+          </a:p>
+          <a:p>
+            <a:pPr lvl="2"/>
+            <a:r>
+              <a:rPr lang="en-US" dirty="0"/>
+              <a:t>Adds a ton of features using code.  </a:t>
+            </a:r>
+          </a:p>
+          <a:p>
+            <a:pPr lvl="1"/>
+            <a:r>
+              <a:rPr lang="en-US" dirty="0"/>
+              <a:t>Using the Adobe ColdFusion API Manager</a:t>
+            </a:r>
+          </a:p>
+          <a:p>
+            <a:pPr lvl="2"/>
+            <a:r>
+              <a:rPr lang="en-US" dirty="0"/>
+              <a:t>Bolt-on product from Adobe that helps implement a ton of features using a Web UI</a:t>
+            </a:r>
+          </a:p>
+          <a:p>
+            <a:pPr lvl="2"/>
+            <a:r>
+              <a:rPr lang="en-US" dirty="0"/>
+              <a:t>Gives access to authentication, analytics, rate limiting, auto-documentation, etc.</a:t>
+            </a:r>
+          </a:p>
+        </p:txBody>
+      </p:sp>
+    </p:spTree>
+    <p:extLst>
+      <p:ext uri="{BB962C8B-B14F-4D97-AF65-F5344CB8AC3E}">
+        <p14:creationId xmlns:p14="http://schemas.microsoft.com/office/powerpoint/2010/main" val="3910170193"/>
+      </p:ext>
+    </p:extLst>
+  </p:cSld>
+  <p:clrMapOvr>
+    <a:masterClrMapping/>
+  </p:clrMapOvr>
+</p:sld>
+</file>
+
+<file path=ppt/slides/slide12.xml><?xml version="1.0" encoding="utf-8"?>
+<p:sld xmlns:a="http://schemas.openxmlformats.org/drawingml/2006/main" xmlns:r="http://schemas.openxmlformats.org/officeDocument/2006/relationships" xmlns:p="http://schemas.openxmlformats.org/presentationml/2006/main">
+  <p:cSld>
+    <p:spTree>
+      <p:nvGrpSpPr>
+        <p:cNvPr id="1" name=""/>
+        <p:cNvGrpSpPr/>
+        <p:nvPr/>
+      </p:nvGrpSpPr>
+      <p:grpSpPr>
+        <a:xfrm>
+          <a:off x="0" y="0"/>
+          <a:ext cx="0" cy="0"/>
+          <a:chOff x="0" y="0"/>
+          <a:chExt cx="0" cy="0"/>
+        </a:xfrm>
+      </p:grpSpPr>
+      <p:sp>
+        <p:nvSpPr>
+          <p:cNvPr id="2" name="Title 1">
+            <a:extLst>
+              <a:ext uri="{FF2B5EF4-FFF2-40B4-BE49-F238E27FC236}">
+                <a16:creationId xmlns:a16="http://schemas.microsoft.com/office/drawing/2014/main" id="{B4BEE435-2C31-982A-AFB1-21754A447B89}"/>
+              </a:ext>
+            </a:extLst>
+          </p:cNvPr>
+          <p:cNvSpPr>
+            <a:spLocks noGrp="1"/>
+          </p:cNvSpPr>
+          <p:nvPr>
+            <p:ph type="title"/>
+          </p:nvPr>
+        </p:nvSpPr>
+        <p:spPr/>
+        <p:txBody>
+          <a:bodyPr/>
+          <a:lstStyle/>
+          <a:p>
+            <a:r>
+              <a:rPr lang="en-US" dirty="0"/>
+              <a:t>REST</a:t>
+            </a:r>
+          </a:p>
+        </p:txBody>
+      </p:sp>
+      <p:sp>
+        <p:nvSpPr>
+          <p:cNvPr id="3" name="Content Placeholder 2">
+            <a:extLst>
+              <a:ext uri="{FF2B5EF4-FFF2-40B4-BE49-F238E27FC236}">
+                <a16:creationId xmlns:a16="http://schemas.microsoft.com/office/drawing/2014/main" id="{4EBF1DCE-9302-5595-8535-FEA64D18126E}"/>
+              </a:ext>
+            </a:extLst>
+          </p:cNvPr>
+          <p:cNvSpPr>
+            <a:spLocks noGrp="1"/>
+          </p:cNvSpPr>
+          <p:nvPr>
+            <p:ph idx="1"/>
+          </p:nvPr>
+        </p:nvSpPr>
+        <p:spPr/>
+        <p:txBody>
+          <a:bodyPr/>
+          <a:lstStyle/>
+          <a:p>
+            <a:r>
+              <a:rPr lang="en-US" dirty="0"/>
+              <a:t>In the ColdFusion world, there are a few ways to create these API endpoints :</a:t>
+            </a:r>
+          </a:p>
+          <a:p>
+            <a:endParaRPr lang="en-US" dirty="0"/>
+          </a:p>
+          <a:p>
+            <a:pPr lvl="1"/>
+            <a:r>
+              <a:rPr lang="en-US" b="1" dirty="0">
+                <a:solidFill>
+                  <a:srgbClr val="FF0000"/>
+                </a:solidFill>
+              </a:rPr>
+              <a:t>Creating REST CFCs in ACF/</a:t>
+            </a:r>
+            <a:r>
+              <a:rPr lang="en-US" b="1" dirty="0" err="1">
+                <a:solidFill>
+                  <a:srgbClr val="FF0000"/>
+                </a:solidFill>
+              </a:rPr>
+              <a:t>Lucee</a:t>
+            </a:r>
+            <a:r>
+              <a:rPr lang="en-US" b="1" dirty="0">
+                <a:solidFill>
+                  <a:srgbClr val="FF0000"/>
+                </a:solidFill>
+              </a:rPr>
+              <a:t> to process data.</a:t>
+            </a:r>
+          </a:p>
+          <a:p>
+            <a:pPr lvl="2"/>
+            <a:r>
+              <a:rPr lang="en-US" dirty="0"/>
+              <a:t>Raw functionality.  You will need to own your own auth, rate limiting, etc.</a:t>
+            </a:r>
+          </a:p>
+          <a:p>
+            <a:pPr lvl="1"/>
+            <a:r>
+              <a:rPr lang="en-US" dirty="0"/>
+              <a:t>Using a framework like Taffy.io to develop your APIs</a:t>
+            </a:r>
+          </a:p>
+          <a:p>
+            <a:pPr lvl="2"/>
+            <a:r>
+              <a:rPr lang="en-US" dirty="0"/>
+              <a:t>Adds a ton of features using code.  </a:t>
+            </a:r>
+          </a:p>
+          <a:p>
+            <a:pPr lvl="1"/>
+            <a:r>
+              <a:rPr lang="en-US" dirty="0"/>
+              <a:t>Using the Adobe ColdFusion API Manager</a:t>
+            </a:r>
+          </a:p>
+          <a:p>
+            <a:pPr lvl="2"/>
+            <a:r>
+              <a:rPr lang="en-US" dirty="0"/>
+              <a:t>Bolt-on product from Adobe that helps implement a ton of features using a Web UI</a:t>
+            </a:r>
+          </a:p>
+          <a:p>
+            <a:pPr lvl="2"/>
+            <a:r>
+              <a:rPr lang="en-US" dirty="0"/>
+              <a:t>Gives access to authentication, analytics, rate limiting, auto-documentation, etc.</a:t>
+            </a:r>
+          </a:p>
+          <a:p>
+            <a:pPr lvl="2"/>
+            <a:endParaRPr lang="en-US" dirty="0"/>
+          </a:p>
+        </p:txBody>
+      </p:sp>
+    </p:spTree>
+    <p:extLst>
+      <p:ext uri="{BB962C8B-B14F-4D97-AF65-F5344CB8AC3E}">
+        <p14:creationId xmlns:p14="http://schemas.microsoft.com/office/powerpoint/2010/main" val="4163620947"/>
+      </p:ext>
+    </p:extLst>
+  </p:cSld>
+  <p:clrMapOvr>
+    <a:masterClrMapping/>
+  </p:clrMapOvr>
+</p:sld>
+</file>
+
+<file path=ppt/slides/slide13.xml><?xml version="1.0" encoding="utf-8"?>
+<p:sld xmlns:a="http://schemas.openxmlformats.org/drawingml/2006/main" xmlns:r="http://schemas.openxmlformats.org/officeDocument/2006/relationships" xmlns:p="http://schemas.openxmlformats.org/presentationml/2006/main">
+  <p:cSld>
+    <p:spTree>
+      <p:nvGrpSpPr>
+        <p:cNvPr id="1" name=""/>
+        <p:cNvGrpSpPr/>
+        <p:nvPr/>
+      </p:nvGrpSpPr>
+      <p:grpSpPr>
+        <a:xfrm>
+          <a:off x="0" y="0"/>
+          <a:ext cx="0" cy="0"/>
+          <a:chOff x="0" y="0"/>
+          <a:chExt cx="0" cy="0"/>
+        </a:xfrm>
+      </p:grpSpPr>
+      <p:sp>
+        <p:nvSpPr>
+          <p:cNvPr id="2" name="Title 1">
+            <a:extLst>
+              <a:ext uri="{FF2B5EF4-FFF2-40B4-BE49-F238E27FC236}">
+                <a16:creationId xmlns:a16="http://schemas.microsoft.com/office/drawing/2014/main" id="{E79531E2-E51B-0BCC-FDC6-F45B56582D0D}"/>
+              </a:ext>
+            </a:extLst>
+          </p:cNvPr>
+          <p:cNvSpPr>
+            <a:spLocks noGrp="1"/>
+          </p:cNvSpPr>
+          <p:nvPr>
+            <p:ph type="title"/>
+          </p:nvPr>
+        </p:nvSpPr>
+        <p:spPr/>
+        <p:txBody>
+          <a:bodyPr/>
+          <a:lstStyle/>
+          <a:p>
+            <a:r>
+              <a:rPr lang="en-US" dirty="0"/>
+              <a:t>REST</a:t>
+            </a:r>
+          </a:p>
+        </p:txBody>
+      </p:sp>
+      <p:sp>
+        <p:nvSpPr>
+          <p:cNvPr id="3" name="Content Placeholder 2">
+            <a:extLst>
+              <a:ext uri="{FF2B5EF4-FFF2-40B4-BE49-F238E27FC236}">
+                <a16:creationId xmlns:a16="http://schemas.microsoft.com/office/drawing/2014/main" id="{836E2FCB-47B2-46ED-7E3C-9FB70D262F99}"/>
+              </a:ext>
+            </a:extLst>
+          </p:cNvPr>
+          <p:cNvSpPr>
+            <a:spLocks noGrp="1"/>
+          </p:cNvSpPr>
+          <p:nvPr>
+            <p:ph idx="1"/>
+          </p:nvPr>
+        </p:nvSpPr>
+        <p:spPr/>
+        <p:txBody>
+          <a:bodyPr/>
+          <a:lstStyle/>
+          <a:p>
+            <a:r>
+              <a:rPr lang="en-US" dirty="0"/>
+              <a:t>Exploring what REST communications look like :</a:t>
+            </a:r>
+          </a:p>
+          <a:p>
+            <a:pPr lvl="1"/>
+            <a:r>
+              <a:rPr lang="en-US" dirty="0">
+                <a:hlinkClick r:id="rId2"/>
+              </a:rPr>
+              <a:t>https://localhost/demo1/</a:t>
+            </a:r>
+            <a:endParaRPr lang="en-US" dirty="0"/>
+          </a:p>
+          <a:p>
+            <a:pPr lvl="1"/>
+            <a:endParaRPr lang="en-US" dirty="0"/>
+          </a:p>
+          <a:p>
+            <a:endParaRPr lang="en-US" dirty="0"/>
+          </a:p>
+        </p:txBody>
+      </p:sp>
+    </p:spTree>
+    <p:extLst>
+      <p:ext uri="{BB962C8B-B14F-4D97-AF65-F5344CB8AC3E}">
+        <p14:creationId xmlns:p14="http://schemas.microsoft.com/office/powerpoint/2010/main" val="4190369622"/>
+      </p:ext>
+    </p:extLst>
+  </p:cSld>
+  <p:clrMapOvr>
+    <a:masterClrMapping/>
+  </p:clrMapOvr>
+</p:sld>
+</file>
+
+<file path=ppt/slides/slide14.xml><?xml version="1.0" encoding="utf-8"?>
+<p:sld xmlns:a="http://schemas.openxmlformats.org/drawingml/2006/main" xmlns:r="http://schemas.openxmlformats.org/officeDocument/2006/relationships" xmlns:p="http://schemas.openxmlformats.org/presentationml/2006/main">
+  <p:cSld>
+    <p:spTree>
+      <p:nvGrpSpPr>
+        <p:cNvPr id="1" name=""/>
+        <p:cNvGrpSpPr/>
+        <p:nvPr/>
+      </p:nvGrpSpPr>
+      <p:grpSpPr>
+        <a:xfrm>
+          <a:off x="0" y="0"/>
+          <a:ext cx="0" cy="0"/>
+          <a:chOff x="0" y="0"/>
+          <a:chExt cx="0" cy="0"/>
+        </a:xfrm>
+      </p:grpSpPr>
+      <p:sp>
+        <p:nvSpPr>
+          <p:cNvPr id="2" name="Title 1">
+            <a:extLst>
+              <a:ext uri="{FF2B5EF4-FFF2-40B4-BE49-F238E27FC236}">
                 <a16:creationId xmlns:a16="http://schemas.microsoft.com/office/drawing/2014/main" id="{D6D7817E-3BB6-40E0-161D-97F8FD105FD9}"/>
               </a:ext>
             </a:extLst>
@@ -2996,7 +3595,7 @@
 </p:sld>
 </file>
 
-<file path=ppt/slides/slide11.xml><?xml version="1.0" encoding="utf-8"?>
+<file path=ppt/slides/slide15.xml><?xml version="1.0" encoding="utf-8"?>
 <p:sld xmlns:a="http://schemas.openxmlformats.org/drawingml/2006/main" xmlns:r="http://schemas.openxmlformats.org/officeDocument/2006/relationships" xmlns:p="http://schemas.openxmlformats.org/presentationml/2006/main">
   <p:cSld>
     <p:spTree>
@@ -3079,7 +3678,7 @@
 </p:sld>
 </file>
 
-<file path=ppt/slides/slide12.xml><?xml version="1.0" encoding="utf-8"?>
+<file path=ppt/slides/slide16.xml><?xml version="1.0" encoding="utf-8"?>
 <p:sld xmlns:a="http://schemas.openxmlformats.org/drawingml/2006/main" xmlns:r="http://schemas.openxmlformats.org/officeDocument/2006/relationships" xmlns:p="http://schemas.openxmlformats.org/presentationml/2006/main">
   <p:cSld>
     <p:spTree>
@@ -3228,7 +3827,7 @@
 </p:sld>
 </file>
 
-<file path=ppt/slides/slide13.xml><?xml version="1.0" encoding="utf-8"?>
+<file path=ppt/slides/slide17.xml><?xml version="1.0" encoding="utf-8"?>
 <p:sld xmlns:a="http://schemas.openxmlformats.org/drawingml/2006/main" xmlns:r="http://schemas.openxmlformats.org/officeDocument/2006/relationships" xmlns:p="http://schemas.openxmlformats.org/presentationml/2006/main">
   <p:cSld>
     <p:spTree>
@@ -3380,7 +3979,7 @@
 </p:sld>
 </file>
 
-<file path=ppt/slides/slide14.xml><?xml version="1.0" encoding="utf-8"?>
+<file path=ppt/slides/slide18.xml><?xml version="1.0" encoding="utf-8"?>
 <p:sld xmlns:a="http://schemas.openxmlformats.org/drawingml/2006/main" xmlns:r="http://schemas.openxmlformats.org/officeDocument/2006/relationships" xmlns:p="http://schemas.openxmlformats.org/presentationml/2006/main">
   <p:cSld>
     <p:spTree>
@@ -3537,7 +4136,7 @@
 </p:sld>
 </file>
 
-<file path=ppt/slides/slide15.xml><?xml version="1.0" encoding="utf-8"?>
+<file path=ppt/slides/slide19.xml><?xml version="1.0" encoding="utf-8"?>
 <p:sld xmlns:a="http://schemas.openxmlformats.org/drawingml/2006/main" xmlns:r="http://schemas.openxmlformats.org/officeDocument/2006/relationships" xmlns:p="http://schemas.openxmlformats.org/presentationml/2006/main">
   <p:cSld>
     <p:spTree>
@@ -3682,7 +4281,145 @@
 </p:sld>
 </file>
 
-<file path=ppt/slides/slide16.xml><?xml version="1.0" encoding="utf-8"?>
+<file path=ppt/slides/slide2.xml><?xml version="1.0" encoding="utf-8"?>
+<p:sld xmlns:a="http://schemas.openxmlformats.org/drawingml/2006/main" xmlns:r="http://schemas.openxmlformats.org/officeDocument/2006/relationships" xmlns:p="http://schemas.openxmlformats.org/presentationml/2006/main">
+  <p:cSld>
+    <p:spTree>
+      <p:nvGrpSpPr>
+        <p:cNvPr id="1" name=""/>
+        <p:cNvGrpSpPr/>
+        <p:nvPr/>
+      </p:nvGrpSpPr>
+      <p:grpSpPr>
+        <a:xfrm>
+          <a:off x="0" y="0"/>
+          <a:ext cx="0" cy="0"/>
+          <a:chOff x="0" y="0"/>
+          <a:chExt cx="0" cy="0"/>
+        </a:xfrm>
+      </p:grpSpPr>
+      <p:sp>
+        <p:nvSpPr>
+          <p:cNvPr id="2" name="Title 1">
+            <a:extLst>
+              <a:ext uri="{FF2B5EF4-FFF2-40B4-BE49-F238E27FC236}">
+                <a16:creationId xmlns:a16="http://schemas.microsoft.com/office/drawing/2014/main" id="{F03EB6AA-1CDC-4828-866D-C55C85CDC37A}"/>
+              </a:ext>
+            </a:extLst>
+          </p:cNvPr>
+          <p:cNvSpPr>
+            <a:spLocks noGrp="1"/>
+          </p:cNvSpPr>
+          <p:nvPr>
+            <p:ph type="title"/>
+          </p:nvPr>
+        </p:nvSpPr>
+        <p:spPr/>
+        <p:txBody>
+          <a:bodyPr/>
+          <a:lstStyle/>
+          <a:p>
+            <a:r>
+              <a:rPr lang="en-US" dirty="0"/>
+              <a:t>Welcome!</a:t>
+            </a:r>
+          </a:p>
+        </p:txBody>
+      </p:sp>
+      <p:sp>
+        <p:nvSpPr>
+          <p:cNvPr id="3" name="Content Placeholder 2">
+            <a:extLst>
+              <a:ext uri="{FF2B5EF4-FFF2-40B4-BE49-F238E27FC236}">
+                <a16:creationId xmlns:a16="http://schemas.microsoft.com/office/drawing/2014/main" id="{691C0B45-76AA-4561-B980-195C1581582C}"/>
+              </a:ext>
+            </a:extLst>
+          </p:cNvPr>
+          <p:cNvSpPr>
+            <a:spLocks noGrp="1"/>
+          </p:cNvSpPr>
+          <p:nvPr>
+            <p:ph idx="1"/>
+          </p:nvPr>
+        </p:nvSpPr>
+        <p:spPr/>
+        <p:txBody>
+          <a:bodyPr>
+            <a:normAutofit lnSpcReduction="10000"/>
+          </a:bodyPr>
+          <a:lstStyle/>
+          <a:p>
+            <a:r>
+              <a:rPr lang="en-US" dirty="0"/>
+              <a:t>Slides, examples and docker images can be found at :</a:t>
+            </a:r>
+          </a:p>
+          <a:p>
+            <a:pPr lvl="1"/>
+            <a:r>
+              <a:rPr lang="en-US" dirty="0">
+                <a:hlinkClick r:id="rId2"/>
+              </a:rPr>
+              <a:t>https://github.com/quetwo/hawaii-apis</a:t>
+            </a:r>
+            <a:r>
+              <a:rPr lang="en-US" dirty="0"/>
+              <a:t> </a:t>
+            </a:r>
+          </a:p>
+          <a:p>
+            <a:pPr lvl="1"/>
+            <a:r>
+              <a:rPr lang="en-US" dirty="0"/>
+              <a:t>Take a look at the README for instructions on getting started.  You have a few minutes while we talk about the basics.</a:t>
+            </a:r>
+          </a:p>
+          <a:p>
+            <a:pPr lvl="1"/>
+            <a:endParaRPr lang="en-US" dirty="0"/>
+          </a:p>
+          <a:p>
+            <a:r>
+              <a:rPr lang="en-US" dirty="0"/>
+              <a:t>This presentation assumes you have a passing knowledge of CFCs and basic CFML.   We will be using the </a:t>
+            </a:r>
+            <a:r>
+              <a:rPr lang="en-US" dirty="0" err="1"/>
+              <a:t>Lucee</a:t>
+            </a:r>
+            <a:r>
+              <a:rPr lang="en-US" dirty="0"/>
+              <a:t> engine and MySQL for our demos, but Adobe CF (version 9.1 and later) and other SQL engines will be nearly identical.</a:t>
+            </a:r>
+          </a:p>
+          <a:p>
+            <a:endParaRPr lang="en-US" dirty="0"/>
+          </a:p>
+          <a:p>
+            <a:r>
+              <a:rPr lang="en-US" dirty="0"/>
+              <a:t>This meeting will be recorded.  </a:t>
+            </a:r>
+          </a:p>
+          <a:p>
+            <a:endParaRPr lang="en-US" dirty="0"/>
+          </a:p>
+        </p:txBody>
+      </p:sp>
+    </p:spTree>
+    <p:extLst>
+      <p:ext uri="{BB962C8B-B14F-4D97-AF65-F5344CB8AC3E}">
+        <p14:creationId xmlns:p14="http://schemas.microsoft.com/office/powerpoint/2010/main" val="3285768562"/>
+      </p:ext>
+    </p:extLst>
+  </p:cSld>
+  <p:clrMapOvr>
+    <a:masterClrMapping/>
+  </p:clrMapOvr>
+</p:sld>
+</file>
+
+<file path=ppt/slides/slide20.xml><?xml version="1.0" encoding="utf-8"?>
 <p:sld xmlns:a="http://schemas.openxmlformats.org/drawingml/2006/main" xmlns:r="http://schemas.openxmlformats.org/officeDocument/2006/relationships" xmlns:p="http://schemas.openxmlformats.org/presentationml/2006/main">
   <p:cSld>
     <p:spTree>
@@ -3798,7 +4535,7 @@
 </p:sld>
 </file>
 
-<file path=ppt/slides/slide17.xml><?xml version="1.0" encoding="utf-8"?>
+<file path=ppt/slides/slide21.xml><?xml version="1.0" encoding="utf-8"?>
 <p:sld xmlns:a="http://schemas.openxmlformats.org/drawingml/2006/main" xmlns:r="http://schemas.openxmlformats.org/officeDocument/2006/relationships" xmlns:p="http://schemas.openxmlformats.org/presentationml/2006/main">
   <p:cSld>
     <p:spTree>
@@ -3916,7 +4653,7 @@
 </p:sld>
 </file>
 
-<file path=ppt/slides/slide18.xml><?xml version="1.0" encoding="utf-8"?>
+<file path=ppt/slides/slide22.xml><?xml version="1.0" encoding="utf-8"?>
 <p:sld xmlns:a="http://schemas.openxmlformats.org/drawingml/2006/main" xmlns:r="http://schemas.openxmlformats.org/officeDocument/2006/relationships" xmlns:p="http://schemas.openxmlformats.org/presentationml/2006/main">
   <p:cSld>
     <p:spTree>
@@ -4058,7 +4795,7 @@
 </p:sld>
 </file>
 
-<file path=ppt/slides/slide19.xml><?xml version="1.0" encoding="utf-8"?>
+<file path=ppt/slides/slide23.xml><?xml version="1.0" encoding="utf-8"?>
 <p:sld xmlns:a="http://schemas.openxmlformats.org/drawingml/2006/main" xmlns:r="http://schemas.openxmlformats.org/officeDocument/2006/relationships" xmlns:p="http://schemas.openxmlformats.org/presentationml/2006/main">
   <p:cSld>
     <p:spTree>
@@ -4145,7 +4882,7 @@
 </p:sld>
 </file>
 
-<file path=ppt/slides/slide2.xml><?xml version="1.0" encoding="utf-8"?>
+<file path=ppt/slides/slide24.xml><?xml version="1.0" encoding="utf-8"?>
 <p:sld xmlns:a="http://schemas.openxmlformats.org/drawingml/2006/main" xmlns:r="http://schemas.openxmlformats.org/officeDocument/2006/relationships" xmlns:p="http://schemas.openxmlformats.org/presentationml/2006/main">
   <p:cSld>
     <p:spTree>
@@ -4167,144 +4904,6 @@
           <p:cNvPr id="2" name="Title 1">
             <a:extLst>
               <a:ext uri="{FF2B5EF4-FFF2-40B4-BE49-F238E27FC236}">
-                <a16:creationId xmlns:a16="http://schemas.microsoft.com/office/drawing/2014/main" id="{F03EB6AA-1CDC-4828-866D-C55C85CDC37A}"/>
-              </a:ext>
-            </a:extLst>
-          </p:cNvPr>
-          <p:cNvSpPr>
-            <a:spLocks noGrp="1"/>
-          </p:cNvSpPr>
-          <p:nvPr>
-            <p:ph type="title"/>
-          </p:nvPr>
-        </p:nvSpPr>
-        <p:spPr/>
-        <p:txBody>
-          <a:bodyPr/>
-          <a:lstStyle/>
-          <a:p>
-            <a:r>
-              <a:rPr lang="en-US" dirty="0"/>
-              <a:t>Welcome!</a:t>
-            </a:r>
-          </a:p>
-        </p:txBody>
-      </p:sp>
-      <p:sp>
-        <p:nvSpPr>
-          <p:cNvPr id="3" name="Content Placeholder 2">
-            <a:extLst>
-              <a:ext uri="{FF2B5EF4-FFF2-40B4-BE49-F238E27FC236}">
-                <a16:creationId xmlns:a16="http://schemas.microsoft.com/office/drawing/2014/main" id="{691C0B45-76AA-4561-B980-195C1581582C}"/>
-              </a:ext>
-            </a:extLst>
-          </p:cNvPr>
-          <p:cNvSpPr>
-            <a:spLocks noGrp="1"/>
-          </p:cNvSpPr>
-          <p:nvPr>
-            <p:ph idx="1"/>
-          </p:nvPr>
-        </p:nvSpPr>
-        <p:spPr/>
-        <p:txBody>
-          <a:bodyPr>
-            <a:normAutofit lnSpcReduction="10000"/>
-          </a:bodyPr>
-          <a:lstStyle/>
-          <a:p>
-            <a:r>
-              <a:rPr lang="en-US" dirty="0"/>
-              <a:t>Slides, examples and docker images can be found at :</a:t>
-            </a:r>
-          </a:p>
-          <a:p>
-            <a:pPr lvl="1"/>
-            <a:r>
-              <a:rPr lang="en-US" dirty="0">
-                <a:hlinkClick r:id="rId2"/>
-              </a:rPr>
-              <a:t>https://github.com/quetwo/hawaii-apis</a:t>
-            </a:r>
-            <a:r>
-              <a:rPr lang="en-US" dirty="0"/>
-              <a:t> </a:t>
-            </a:r>
-          </a:p>
-          <a:p>
-            <a:pPr lvl="1"/>
-            <a:r>
-              <a:rPr lang="en-US" dirty="0"/>
-              <a:t>Take a look at the README for instructions on getting started.  You have a few minutes while we talk about the basics.</a:t>
-            </a:r>
-          </a:p>
-          <a:p>
-            <a:pPr lvl="1"/>
-            <a:endParaRPr lang="en-US" dirty="0"/>
-          </a:p>
-          <a:p>
-            <a:r>
-              <a:rPr lang="en-US" dirty="0"/>
-              <a:t>This presentation assumes you have a passing knowledge of CFCs and basic CFML.   We will be using the </a:t>
-            </a:r>
-            <a:r>
-              <a:rPr lang="en-US" dirty="0" err="1"/>
-              <a:t>Lucee</a:t>
-            </a:r>
-            <a:r>
-              <a:rPr lang="en-US" dirty="0"/>
-              <a:t> engine and MySQL for our demos, but Adobe CF (version 9.1 and later) and other SQL engines will be nearly identical.</a:t>
-            </a:r>
-          </a:p>
-          <a:p>
-            <a:endParaRPr lang="en-US" dirty="0"/>
-          </a:p>
-          <a:p>
-            <a:r>
-              <a:rPr lang="en-US" dirty="0"/>
-              <a:t>This meeting will be recorded.  </a:t>
-            </a:r>
-          </a:p>
-          <a:p>
-            <a:endParaRPr lang="en-US" dirty="0"/>
-          </a:p>
-        </p:txBody>
-      </p:sp>
-    </p:spTree>
-    <p:extLst>
-      <p:ext uri="{BB962C8B-B14F-4D97-AF65-F5344CB8AC3E}">
-        <p14:creationId xmlns:p14="http://schemas.microsoft.com/office/powerpoint/2010/main" val="3285768562"/>
-      </p:ext>
-    </p:extLst>
-  </p:cSld>
-  <p:clrMapOvr>
-    <a:masterClrMapping/>
-  </p:clrMapOvr>
-</p:sld>
-</file>
-
-<file path=ppt/slides/slide20.xml><?xml version="1.0" encoding="utf-8"?>
-<p:sld xmlns:a="http://schemas.openxmlformats.org/drawingml/2006/main" xmlns:r="http://schemas.openxmlformats.org/officeDocument/2006/relationships" xmlns:p="http://schemas.openxmlformats.org/presentationml/2006/main">
-  <p:cSld>
-    <p:spTree>
-      <p:nvGrpSpPr>
-        <p:cNvPr id="1" name=""/>
-        <p:cNvGrpSpPr/>
-        <p:nvPr/>
-      </p:nvGrpSpPr>
-      <p:grpSpPr>
-        <a:xfrm>
-          <a:off x="0" y="0"/>
-          <a:ext cx="0" cy="0"/>
-          <a:chOff x="0" y="0"/>
-          <a:chExt cx="0" cy="0"/>
-        </a:xfrm>
-      </p:grpSpPr>
-      <p:sp>
-        <p:nvSpPr>
-          <p:cNvPr id="2" name="Title 1">
-            <a:extLst>
-              <a:ext uri="{FF2B5EF4-FFF2-40B4-BE49-F238E27FC236}">
                 <a16:creationId xmlns:a16="http://schemas.microsoft.com/office/drawing/2014/main" id="{C9D416EE-320F-7567-A2AB-66EC4B550CF8}"/>
               </a:ext>
             </a:extLst>
@@ -4402,7 +5001,7 @@
 </p:sld>
 </file>
 
-<file path=ppt/slides/slide21.xml><?xml version="1.0" encoding="utf-8"?>
+<file path=ppt/slides/slide25.xml><?xml version="1.0" encoding="utf-8"?>
 <p:sld xmlns:a="http://schemas.openxmlformats.org/drawingml/2006/main" xmlns:r="http://schemas.openxmlformats.org/officeDocument/2006/relationships" xmlns:p="http://schemas.openxmlformats.org/presentationml/2006/main">
   <p:cSld>
     <p:spTree>
@@ -4524,7 +5123,7 @@
 </p:sld>
 </file>
 
-<file path=ppt/slides/slide22.xml><?xml version="1.0" encoding="utf-8"?>
+<file path=ppt/slides/slide26.xml><?xml version="1.0" encoding="utf-8"?>
 <p:sld xmlns:a="http://schemas.openxmlformats.org/drawingml/2006/main" xmlns:r="http://schemas.openxmlformats.org/officeDocument/2006/relationships" xmlns:p="http://schemas.openxmlformats.org/presentationml/2006/main">
   <p:cSld>
     <p:spTree>
@@ -4612,7 +5211,7 @@
 </p:sld>
 </file>
 
-<file path=ppt/slides/slide23.xml><?xml version="1.0" encoding="utf-8"?>
+<file path=ppt/slides/slide27.xml><?xml version="1.0" encoding="utf-8"?>
 <p:sld xmlns:a="http://schemas.openxmlformats.org/drawingml/2006/main" xmlns:r="http://schemas.openxmlformats.org/officeDocument/2006/relationships" xmlns:p="http://schemas.openxmlformats.org/presentationml/2006/main">
   <p:cSld>
     <p:spTree>
@@ -4750,7 +5349,7 @@
 </p:sld>
 </file>
 
-<file path=ppt/slides/slide24.xml><?xml version="1.0" encoding="utf-8"?>
+<file path=ppt/slides/slide28.xml><?xml version="1.0" encoding="utf-8"?>
 <p:sld xmlns:a="http://schemas.openxmlformats.org/drawingml/2006/main" xmlns:r="http://schemas.openxmlformats.org/officeDocument/2006/relationships" xmlns:p="http://schemas.openxmlformats.org/presentationml/2006/main">
   <p:cSld>
     <p:spTree>
@@ -4837,7 +5436,7 @@
 </p:sld>
 </file>
 
-<file path=ppt/slides/slide25.xml><?xml version="1.0" encoding="utf-8"?>
+<file path=ppt/slides/slide29.xml><?xml version="1.0" encoding="utf-8"?>
 <p:sld xmlns:a="http://schemas.openxmlformats.org/drawingml/2006/main" xmlns:r="http://schemas.openxmlformats.org/officeDocument/2006/relationships" xmlns:p="http://schemas.openxmlformats.org/presentationml/2006/main">
   <p:cSld>
     <p:spTree>
@@ -4984,7 +5583,120 @@
 </p:sld>
 </file>
 
-<file path=ppt/slides/slide26.xml><?xml version="1.0" encoding="utf-8"?>
+<file path=ppt/slides/slide3.xml><?xml version="1.0" encoding="utf-8"?>
+<p:sld xmlns:a="http://schemas.openxmlformats.org/drawingml/2006/main" xmlns:r="http://schemas.openxmlformats.org/officeDocument/2006/relationships" xmlns:p="http://schemas.openxmlformats.org/presentationml/2006/main">
+  <p:cSld>
+    <p:spTree>
+      <p:nvGrpSpPr>
+        <p:cNvPr id="1" name=""/>
+        <p:cNvGrpSpPr/>
+        <p:nvPr/>
+      </p:nvGrpSpPr>
+      <p:grpSpPr>
+        <a:xfrm>
+          <a:off x="0" y="0"/>
+          <a:ext cx="0" cy="0"/>
+          <a:chOff x="0" y="0"/>
+          <a:chExt cx="0" cy="0"/>
+        </a:xfrm>
+      </p:grpSpPr>
+      <p:sp>
+        <p:nvSpPr>
+          <p:cNvPr id="2" name="Title 1">
+            <a:extLst>
+              <a:ext uri="{FF2B5EF4-FFF2-40B4-BE49-F238E27FC236}">
+                <a16:creationId xmlns:a16="http://schemas.microsoft.com/office/drawing/2014/main" id="{42EC7050-BC47-4D3A-8052-66D0B281666D}"/>
+              </a:ext>
+            </a:extLst>
+          </p:cNvPr>
+          <p:cNvSpPr>
+            <a:spLocks noGrp="1"/>
+          </p:cNvSpPr>
+          <p:nvPr>
+            <p:ph type="title"/>
+          </p:nvPr>
+        </p:nvSpPr>
+        <p:spPr/>
+        <p:txBody>
+          <a:bodyPr/>
+          <a:lstStyle/>
+          <a:p>
+            <a:r>
+              <a:rPr lang="en-US" dirty="0"/>
+              <a:t>About Nick</a:t>
+            </a:r>
+          </a:p>
+        </p:txBody>
+      </p:sp>
+      <p:sp>
+        <p:nvSpPr>
+          <p:cNvPr id="3" name="Content Placeholder 2">
+            <a:extLst>
+              <a:ext uri="{FF2B5EF4-FFF2-40B4-BE49-F238E27FC236}">
+                <a16:creationId xmlns:a16="http://schemas.microsoft.com/office/drawing/2014/main" id="{B608C4D2-5E63-4E3A-AC35-681C154CDAE6}"/>
+              </a:ext>
+            </a:extLst>
+          </p:cNvPr>
+          <p:cNvSpPr>
+            <a:spLocks noGrp="1"/>
+          </p:cNvSpPr>
+          <p:nvPr>
+            <p:ph idx="1"/>
+          </p:nvPr>
+        </p:nvSpPr>
+        <p:spPr/>
+        <p:txBody>
+          <a:bodyPr/>
+          <a:lstStyle/>
+          <a:p>
+            <a:r>
+              <a:rPr lang="en-US" dirty="0"/>
+              <a:t>CF programmer since the mid 90’s – started with CF 4.0.1</a:t>
+            </a:r>
+          </a:p>
+          <a:p>
+            <a:r>
+              <a:rPr lang="en-US" dirty="0"/>
+              <a:t>Member of the Apache Foundation, and a committer to a few projects</a:t>
+            </a:r>
+          </a:p>
+          <a:p>
+            <a:r>
+              <a:rPr lang="en-US" dirty="0"/>
+              <a:t>MMCFUG member and contributor</a:t>
+            </a:r>
+          </a:p>
+          <a:p>
+            <a:endParaRPr lang="en-US" dirty="0"/>
+          </a:p>
+          <a:p>
+            <a:r>
+              <a:rPr lang="en-US" dirty="0"/>
+              <a:t>Adjunct Professor at Michigan State University in the College of Communication Arts and Sciences</a:t>
+            </a:r>
+          </a:p>
+          <a:p>
+            <a:r>
+              <a:rPr lang="en-US" dirty="0"/>
+              <a:t>Manager of the Unified Communications Team at Michigan State University</a:t>
+            </a:r>
+          </a:p>
+        </p:txBody>
+      </p:sp>
+    </p:spTree>
+    <p:extLst>
+      <p:ext uri="{BB962C8B-B14F-4D97-AF65-F5344CB8AC3E}">
+        <p14:creationId xmlns:p14="http://schemas.microsoft.com/office/powerpoint/2010/main" val="1647056012"/>
+      </p:ext>
+    </p:extLst>
+  </p:cSld>
+  <p:clrMapOvr>
+    <a:masterClrMapping/>
+  </p:clrMapOvr>
+</p:sld>
+</file>
+
+<file path=ppt/slides/slide30.xml><?xml version="1.0" encoding="utf-8"?>
 <p:sld xmlns:a="http://schemas.openxmlformats.org/drawingml/2006/main" xmlns:r="http://schemas.openxmlformats.org/officeDocument/2006/relationships" xmlns:p="http://schemas.openxmlformats.org/presentationml/2006/main">
   <p:cSld>
     <p:spTree>
@@ -5131,7 +5843,7 @@
 </p:sld>
 </file>
 
-<file path=ppt/slides/slide27.xml><?xml version="1.0" encoding="utf-8"?>
+<file path=ppt/slides/slide31.xml><?xml version="1.0" encoding="utf-8"?>
 <p:sld xmlns:a="http://schemas.openxmlformats.org/drawingml/2006/main" xmlns:r="http://schemas.openxmlformats.org/officeDocument/2006/relationships" xmlns:p="http://schemas.openxmlformats.org/presentationml/2006/main">
   <p:cSld>
     <p:spTree>
@@ -5205,119 +5917,6 @@
     <p:extLst>
       <p:ext uri="{BB962C8B-B14F-4D97-AF65-F5344CB8AC3E}">
         <p14:creationId xmlns:p14="http://schemas.microsoft.com/office/powerpoint/2010/main" val="1728296305"/>
-      </p:ext>
-    </p:extLst>
-  </p:cSld>
-  <p:clrMapOvr>
-    <a:masterClrMapping/>
-  </p:clrMapOvr>
-</p:sld>
-</file>
-
-<file path=ppt/slides/slide3.xml><?xml version="1.0" encoding="utf-8"?>
-<p:sld xmlns:a="http://schemas.openxmlformats.org/drawingml/2006/main" xmlns:r="http://schemas.openxmlformats.org/officeDocument/2006/relationships" xmlns:p="http://schemas.openxmlformats.org/presentationml/2006/main">
-  <p:cSld>
-    <p:spTree>
-      <p:nvGrpSpPr>
-        <p:cNvPr id="1" name=""/>
-        <p:cNvGrpSpPr/>
-        <p:nvPr/>
-      </p:nvGrpSpPr>
-      <p:grpSpPr>
-        <a:xfrm>
-          <a:off x="0" y="0"/>
-          <a:ext cx="0" cy="0"/>
-          <a:chOff x="0" y="0"/>
-          <a:chExt cx="0" cy="0"/>
-        </a:xfrm>
-      </p:grpSpPr>
-      <p:sp>
-        <p:nvSpPr>
-          <p:cNvPr id="2" name="Title 1">
-            <a:extLst>
-              <a:ext uri="{FF2B5EF4-FFF2-40B4-BE49-F238E27FC236}">
-                <a16:creationId xmlns:a16="http://schemas.microsoft.com/office/drawing/2014/main" id="{42EC7050-BC47-4D3A-8052-66D0B281666D}"/>
-              </a:ext>
-            </a:extLst>
-          </p:cNvPr>
-          <p:cNvSpPr>
-            <a:spLocks noGrp="1"/>
-          </p:cNvSpPr>
-          <p:nvPr>
-            <p:ph type="title"/>
-          </p:nvPr>
-        </p:nvSpPr>
-        <p:spPr/>
-        <p:txBody>
-          <a:bodyPr/>
-          <a:lstStyle/>
-          <a:p>
-            <a:r>
-              <a:rPr lang="en-US" dirty="0"/>
-              <a:t>About Nick</a:t>
-            </a:r>
-          </a:p>
-        </p:txBody>
-      </p:sp>
-      <p:sp>
-        <p:nvSpPr>
-          <p:cNvPr id="3" name="Content Placeholder 2">
-            <a:extLst>
-              <a:ext uri="{FF2B5EF4-FFF2-40B4-BE49-F238E27FC236}">
-                <a16:creationId xmlns:a16="http://schemas.microsoft.com/office/drawing/2014/main" id="{B608C4D2-5E63-4E3A-AC35-681C154CDAE6}"/>
-              </a:ext>
-            </a:extLst>
-          </p:cNvPr>
-          <p:cNvSpPr>
-            <a:spLocks noGrp="1"/>
-          </p:cNvSpPr>
-          <p:nvPr>
-            <p:ph idx="1"/>
-          </p:nvPr>
-        </p:nvSpPr>
-        <p:spPr/>
-        <p:txBody>
-          <a:bodyPr/>
-          <a:lstStyle/>
-          <a:p>
-            <a:r>
-              <a:rPr lang="en-US" dirty="0"/>
-              <a:t>CF programmer since the mid 90’s – started with CF 4.0.1</a:t>
-            </a:r>
-          </a:p>
-          <a:p>
-            <a:r>
-              <a:rPr lang="en-US" dirty="0"/>
-              <a:t>Member of the Apache Foundation, and a committer to a few projects</a:t>
-            </a:r>
-          </a:p>
-          <a:p>
-            <a:r>
-              <a:rPr lang="en-US" dirty="0"/>
-              <a:t>MMCFUG member and contributor</a:t>
-            </a:r>
-          </a:p>
-          <a:p>
-            <a:endParaRPr lang="en-US" dirty="0"/>
-          </a:p>
-          <a:p>
-            <a:r>
-              <a:rPr lang="en-US" dirty="0"/>
-              <a:t>Adjunct Professor at Michigan State University in the College of Communication Arts and Sciences</a:t>
-            </a:r>
-          </a:p>
-          <a:p>
-            <a:r>
-              <a:rPr lang="en-US" dirty="0"/>
-              <a:t>Manager of the Unified Communications Team at Michigan State University</a:t>
-            </a:r>
-          </a:p>
-        </p:txBody>
-      </p:sp>
-    </p:spTree>
-    <p:extLst>
-      <p:ext uri="{BB962C8B-B14F-4D97-AF65-F5344CB8AC3E}">
-        <p14:creationId xmlns:p14="http://schemas.microsoft.com/office/powerpoint/2010/main" val="1647056012"/>
       </p:ext>
     </p:extLst>
   </p:cSld>
@@ -5349,7 +5948,7 @@
           <p:cNvPr id="4" name="Title 3">
             <a:extLst>
               <a:ext uri="{FF2B5EF4-FFF2-40B4-BE49-F238E27FC236}">
-                <a16:creationId xmlns:a16="http://schemas.microsoft.com/office/drawing/2014/main" id="{A983F497-E090-4AF7-B888-87F6569739BE}"/>
+                <a16:creationId xmlns:a16="http://schemas.microsoft.com/office/drawing/2014/main" id="{C286E0A8-C039-7A88-D342-A7890AE3B8C1}"/>
               </a:ext>
             </a:extLst>
           </p:cNvPr>
@@ -5367,7 +5966,7 @@
           <a:p>
             <a:r>
               <a:rPr lang="en-US" dirty="0"/>
-              <a:t>What is REST?</a:t>
+              <a:t>APIs</a:t>
             </a:r>
           </a:p>
         </p:txBody>
@@ -5377,7 +5976,7 @@
           <p:cNvPr id="5" name="Text Placeholder 4">
             <a:extLst>
               <a:ext uri="{FF2B5EF4-FFF2-40B4-BE49-F238E27FC236}">
-                <a16:creationId xmlns:a16="http://schemas.microsoft.com/office/drawing/2014/main" id="{5751667A-D992-4C0F-991E-5A592EC8FA57}"/>
+                <a16:creationId xmlns:a16="http://schemas.microsoft.com/office/drawing/2014/main" id="{237CF3FE-4114-5005-FF1C-3EFD50BF69CF}"/>
               </a:ext>
             </a:extLst>
           </p:cNvPr>
@@ -5400,7 +5999,7 @@
     </p:spTree>
     <p:extLst>
       <p:ext uri="{BB962C8B-B14F-4D97-AF65-F5344CB8AC3E}">
-        <p14:creationId xmlns:p14="http://schemas.microsoft.com/office/powerpoint/2010/main" val="2994410301"/>
+        <p14:creationId xmlns:p14="http://schemas.microsoft.com/office/powerpoint/2010/main" val="2744605756"/>
       </p:ext>
     </p:extLst>
   </p:cSld>
@@ -5429,10 +6028,10 @@
       </p:grpSpPr>
       <p:sp>
         <p:nvSpPr>
-          <p:cNvPr id="4" name="Title 3">
-            <a:extLst>
-              <a:ext uri="{FF2B5EF4-FFF2-40B4-BE49-F238E27FC236}">
-                <a16:creationId xmlns:a16="http://schemas.microsoft.com/office/drawing/2014/main" id="{51082C4D-0085-350F-81C2-D7FBE3F6AEB3}"/>
+          <p:cNvPr id="2" name="Title 1">
+            <a:extLst>
+              <a:ext uri="{FF2B5EF4-FFF2-40B4-BE49-F238E27FC236}">
+                <a16:creationId xmlns:a16="http://schemas.microsoft.com/office/drawing/2014/main" id="{B4534FDF-E57A-1B98-EEE8-EA8D663B4E26}"/>
               </a:ext>
             </a:extLst>
           </p:cNvPr>
@@ -5450,17 +6049,17 @@
           <a:p>
             <a:r>
               <a:rPr lang="en-US" dirty="0"/>
-              <a:t>What is REST</a:t>
-            </a:r>
-          </a:p>
-        </p:txBody>
-      </p:sp>
-      <p:sp>
-        <p:nvSpPr>
-          <p:cNvPr id="5" name="Content Placeholder 4">
-            <a:extLst>
-              <a:ext uri="{FF2B5EF4-FFF2-40B4-BE49-F238E27FC236}">
-                <a16:creationId xmlns:a16="http://schemas.microsoft.com/office/drawing/2014/main" id="{745AD351-73B5-CE48-DE9F-9B98E76F02DB}"/>
+              <a:t>APIs</a:t>
+            </a:r>
+          </a:p>
+        </p:txBody>
+      </p:sp>
+      <p:sp>
+        <p:nvSpPr>
+          <p:cNvPr id="3" name="Content Placeholder 2">
+            <a:extLst>
+              <a:ext uri="{FF2B5EF4-FFF2-40B4-BE49-F238E27FC236}">
+                <a16:creationId xmlns:a16="http://schemas.microsoft.com/office/drawing/2014/main" id="{DA3C829C-CD69-4A4E-0028-4CE07C29911A}"/>
               </a:ext>
             </a:extLst>
           </p:cNvPr>
@@ -5477,60 +6076,39 @@
           <a:lstStyle/>
           <a:p>
             <a:r>
-              <a:rPr lang="en-US" b="1" dirty="0"/>
-              <a:t>REST</a:t>
-            </a:r>
-            <a:r>
-              <a:rPr lang="en-US" dirty="0"/>
-              <a:t> = Representational State Transfer</a:t>
+              <a:rPr lang="en-US" dirty="0"/>
+              <a:t>APIs (Application Programming Interfaces) are a way to allow application-to-application transmission of data.</a:t>
             </a:r>
           </a:p>
           <a:p>
             <a:pPr lvl="1"/>
             <a:r>
               <a:rPr lang="en-US" dirty="0"/>
-              <a:t>Using the metadata of an HTTP call to convey data and select interfaces.</a:t>
+              <a:t>Typically designed as programmer interfaces between programs and services</a:t>
             </a:r>
           </a:p>
           <a:p>
             <a:pPr lvl="1"/>
             <a:r>
               <a:rPr lang="en-US" dirty="0"/>
-              <a:t>Used for machine-to-machine data transfers in a normalized way.</a:t>
-            </a:r>
-          </a:p>
-          <a:p>
-            <a:pPr lvl="1"/>
+              <a:t>Not necessary human readable consumption – not uncommon for requests and responses to come in binary, XML, or other formats.</a:t>
+            </a:r>
+          </a:p>
+          <a:p>
             <a:endParaRPr lang="en-US" dirty="0"/>
           </a:p>
           <a:p>
-            <a:pPr lvl="1"/>
-            <a:r>
-              <a:rPr lang="en-US" dirty="0"/>
-              <a:t>Unlike SOAP, RPC and other communication methods, there is no ‘official’ standard to follow or RFC to define how it is designed to work.  It’s just the thought of using the existing protocols.</a:t>
-            </a:r>
-          </a:p>
-          <a:p>
-            <a:pPr lvl="1"/>
-            <a:endParaRPr lang="en-US" dirty="0"/>
-          </a:p>
-          <a:p>
-            <a:pPr lvl="1"/>
-            <a:r>
-              <a:rPr lang="en-US" dirty="0"/>
-              <a:t>Generally used to expose APIs from your applications to either be consumed by your site or to express data to others.</a:t>
-            </a:r>
-          </a:p>
-          <a:p>
-            <a:pPr lvl="1"/>
-            <a:endParaRPr lang="en-US" dirty="0"/>
+            <a:r>
+              <a:rPr lang="en-US" dirty="0"/>
+              <a:t>Used by practically every org and service out there to transmit data between orgs and within orgs.</a:t>
+            </a:r>
           </a:p>
         </p:txBody>
       </p:sp>
     </p:spTree>
     <p:extLst>
       <p:ext uri="{BB962C8B-B14F-4D97-AF65-F5344CB8AC3E}">
-        <p14:creationId xmlns:p14="http://schemas.microsoft.com/office/powerpoint/2010/main" val="124280322"/>
+        <p14:creationId xmlns:p14="http://schemas.microsoft.com/office/powerpoint/2010/main" val="3556948251"/>
       </p:ext>
     </p:extLst>
   </p:cSld>
@@ -5562,7 +6140,7 @@
           <p:cNvPr id="2" name="Title 1">
             <a:extLst>
               <a:ext uri="{FF2B5EF4-FFF2-40B4-BE49-F238E27FC236}">
-                <a16:creationId xmlns:a16="http://schemas.microsoft.com/office/drawing/2014/main" id="{A1D15F9A-8216-226D-DD45-362B470A78E0}"/>
+                <a16:creationId xmlns:a16="http://schemas.microsoft.com/office/drawing/2014/main" id="{DB44945C-9939-5E5C-AD0B-795D42E0A1B8}"/>
               </a:ext>
             </a:extLst>
           </p:cNvPr>
@@ -5578,7 +6156,10 @@
           <a:bodyPr/>
           <a:lstStyle/>
           <a:p>
-            <a:endParaRPr lang="en-US"/>
+            <a:r>
+              <a:rPr lang="en-US" dirty="0"/>
+              <a:t>APIs</a:t>
+            </a:r>
           </a:p>
         </p:txBody>
       </p:sp>
@@ -5587,7 +6168,7 @@
           <p:cNvPr id="3" name="Content Placeholder 2">
             <a:extLst>
               <a:ext uri="{FF2B5EF4-FFF2-40B4-BE49-F238E27FC236}">
-                <a16:creationId xmlns:a16="http://schemas.microsoft.com/office/drawing/2014/main" id="{F7A42A19-0EC2-A033-CEF8-DB644D343C2E}"/>
+                <a16:creationId xmlns:a16="http://schemas.microsoft.com/office/drawing/2014/main" id="{9BB5EB41-954F-84F4-B282-173218EAAD3E}"/>
               </a:ext>
             </a:extLst>
           </p:cNvPr>
@@ -5603,110 +6184,45 @@
           <a:bodyPr/>
           <a:lstStyle/>
           <a:p>
-            <a:endParaRPr lang="en-US" dirty="0"/>
-          </a:p>
-          <a:p>
-            <a:endParaRPr lang="en-US" dirty="0"/>
-          </a:p>
-          <a:p>
-            <a:r>
-              <a:rPr lang="en-US" dirty="0"/>
-              <a:t>METHOD = GET</a:t>
-            </a:r>
-          </a:p>
-          <a:p>
-            <a:endParaRPr lang="en-US" dirty="0"/>
-          </a:p>
-          <a:p>
-            <a:endParaRPr lang="en-US" dirty="0"/>
-          </a:p>
-          <a:p>
-            <a:endParaRPr lang="en-US" dirty="0"/>
-          </a:p>
-          <a:p>
-            <a:r>
-              <a:rPr lang="en-US" dirty="0"/>
-              <a:t>Headers : </a:t>
-            </a:r>
-            <a:br>
-              <a:rPr lang="en-US" dirty="0"/>
-            </a:br>
-            <a:r>
-              <a:rPr lang="en-US" dirty="0"/>
-              <a:t>    ACCEPT : text/html</a:t>
-            </a:r>
-            <a:br>
-              <a:rPr lang="en-US" dirty="0"/>
-            </a:br>
-            <a:r>
-              <a:rPr lang="en-US" dirty="0"/>
-              <a:t>    Authentication-token :  Bearer : abc:123</a:t>
-            </a:r>
-          </a:p>
-          <a:p>
-            <a:endParaRPr lang="en-US" dirty="0"/>
-          </a:p>
-        </p:txBody>
-      </p:sp>
-      <p:sp>
-        <p:nvSpPr>
-          <p:cNvPr id="4" name="Rectangle 3">
-            <a:extLst>
-              <a:ext uri="{FF2B5EF4-FFF2-40B4-BE49-F238E27FC236}">
-                <a16:creationId xmlns:a16="http://schemas.microsoft.com/office/drawing/2014/main" id="{8A268F85-86C5-F0C0-0A4C-710A3CDE18B1}"/>
-              </a:ext>
-            </a:extLst>
-          </p:cNvPr>
-          <p:cNvSpPr/>
-          <p:nvPr/>
-        </p:nvSpPr>
-        <p:spPr>
-          <a:xfrm>
-            <a:off x="173124" y="2967335"/>
-            <a:ext cx="10627397" cy="923330"/>
-          </a:xfrm>
-          <a:prstGeom prst="rect">
-            <a:avLst/>
-          </a:prstGeom>
-          <a:noFill/>
-        </p:spPr>
-        <p:txBody>
-          <a:bodyPr wrap="none" lIns="91440" tIns="45720" rIns="91440" bIns="45720">
-            <a:spAutoFit/>
-          </a:bodyPr>
-          <a:lstStyle/>
-          <a:p>
-            <a:pPr algn="ctr"/>
-            <a:r>
-              <a:rPr lang="en-US" sz="5400" b="1" cap="none" spc="0" dirty="0">
-                <a:ln w="12700">
-                  <a:solidFill>
-                    <a:schemeClr val="tx2">
-                      <a:lumMod val="75000"/>
-                    </a:schemeClr>
-                  </a:solidFill>
-                  <a:prstDash val="solid"/>
-                </a:ln>
-                <a:pattFill prst="dkUpDiag">
-                  <a:fgClr>
-                    <a:schemeClr val="tx2"/>
-                  </a:fgClr>
-                  <a:bgClr>
-                    <a:schemeClr val="tx2">
-                      <a:lumMod val="20000"/>
-                      <a:lumOff val="80000"/>
-                    </a:schemeClr>
-                  </a:bgClr>
-                </a:pattFill>
-                <a:effectLst>
-                  <a:outerShdw dist="38100" dir="2640000" algn="bl" rotWithShape="0">
-                    <a:schemeClr val="tx2">
-                      <a:lumMod val="75000"/>
-                    </a:schemeClr>
-                  </a:outerShdw>
-                </a:effectLst>
-              </a:rPr>
-              <a:t>http://server/application/endpoint/</a:t>
+            <a:r>
+              <a:rPr lang="en-US" dirty="0"/>
+              <a:t>APIs usually are exposed via ‘constitutions’ or agreements between the provider and the client</a:t>
+            </a:r>
+          </a:p>
+          <a:p>
+            <a:pPr lvl="1"/>
+            <a:r>
+              <a:rPr lang="en-US" dirty="0"/>
+              <a:t>The provider of the data would set some sort of expectation on how the client would obtain that data.  This could be through documentation or some sort of discovery service.</a:t>
+            </a:r>
+          </a:p>
+          <a:p>
+            <a:pPr lvl="1"/>
+            <a:r>
+              <a:rPr lang="en-US" dirty="0"/>
+              <a:t>The expectation would then be that the client would request that data in the manner that the service is expecting.</a:t>
+            </a:r>
+          </a:p>
+          <a:p>
+            <a:pPr lvl="1"/>
+            <a:r>
+              <a:rPr lang="en-US" dirty="0"/>
+              <a:t>The expectation would then be that the provider would return the data in the way that the client is expecting.</a:t>
+            </a:r>
+          </a:p>
+          <a:p>
+            <a:pPr lvl="1"/>
+            <a:r>
+              <a:rPr lang="en-US" dirty="0"/>
+              <a:t>Typically, the data would be returned in a formatted, computer </a:t>
+            </a:r>
+            <a:r>
+              <a:rPr lang="en-US" dirty="0" err="1"/>
+              <a:t>parseable</a:t>
+            </a:r>
+            <a:r>
+              <a:rPr lang="en-US" dirty="0"/>
+              <a:t> way that the application developer would be able to do something with.</a:t>
             </a:r>
           </a:p>
         </p:txBody>
@@ -5714,7 +6230,7 @@
     </p:spTree>
     <p:extLst>
       <p:ext uri="{BB962C8B-B14F-4D97-AF65-F5344CB8AC3E}">
-        <p14:creationId xmlns:p14="http://schemas.microsoft.com/office/powerpoint/2010/main" val="95246152"/>
+        <p14:creationId xmlns:p14="http://schemas.microsoft.com/office/powerpoint/2010/main" val="4260712389"/>
       </p:ext>
     </p:extLst>
   </p:cSld>
@@ -5746,7 +6262,7 @@
           <p:cNvPr id="2" name="Title 1">
             <a:extLst>
               <a:ext uri="{FF2B5EF4-FFF2-40B4-BE49-F238E27FC236}">
-                <a16:creationId xmlns:a16="http://schemas.microsoft.com/office/drawing/2014/main" id="{B4BEE435-2C31-982A-AFB1-21754A447B89}"/>
+                <a16:creationId xmlns:a16="http://schemas.microsoft.com/office/drawing/2014/main" id="{F8680A01-BF70-E999-B5FE-D32E9EE3A1BE}"/>
               </a:ext>
             </a:extLst>
           </p:cNvPr>
@@ -5764,103 +6280,92 @@
           <a:p>
             <a:r>
               <a:rPr lang="en-US" dirty="0"/>
+              <a:t>APIs</a:t>
+            </a:r>
+          </a:p>
+        </p:txBody>
+      </p:sp>
+      <p:sp>
+        <p:nvSpPr>
+          <p:cNvPr id="3" name="Content Placeholder 2">
+            <a:extLst>
+              <a:ext uri="{FF2B5EF4-FFF2-40B4-BE49-F238E27FC236}">
+                <a16:creationId xmlns:a16="http://schemas.microsoft.com/office/drawing/2014/main" id="{6A06FCF0-4F94-9837-EC35-5ACF52C029FE}"/>
+              </a:ext>
+            </a:extLst>
+          </p:cNvPr>
+          <p:cNvSpPr>
+            <a:spLocks noGrp="1"/>
+          </p:cNvSpPr>
+          <p:nvPr>
+            <p:ph idx="1"/>
+          </p:nvPr>
+        </p:nvSpPr>
+        <p:spPr/>
+        <p:txBody>
+          <a:bodyPr/>
+          <a:lstStyle/>
+          <a:p>
+            <a:r>
+              <a:rPr lang="en-US" dirty="0"/>
+              <a:t>These days, most APIs on the internet are exposed as </a:t>
+            </a:r>
+            <a:r>
+              <a:rPr lang="en-US" b="1" i="1" dirty="0"/>
               <a:t>REST</a:t>
             </a:r>
-          </a:p>
-        </p:txBody>
-      </p:sp>
-      <p:sp>
-        <p:nvSpPr>
-          <p:cNvPr id="3" name="Content Placeholder 2">
-            <a:extLst>
-              <a:ext uri="{FF2B5EF4-FFF2-40B4-BE49-F238E27FC236}">
-                <a16:creationId xmlns:a16="http://schemas.microsoft.com/office/drawing/2014/main" id="{4EBF1DCE-9302-5595-8535-FEA64D18126E}"/>
-              </a:ext>
-            </a:extLst>
-          </p:cNvPr>
-          <p:cNvSpPr>
-            <a:spLocks noGrp="1"/>
-          </p:cNvSpPr>
-          <p:nvPr>
-            <p:ph idx="1"/>
-          </p:nvPr>
-        </p:nvSpPr>
-        <p:spPr/>
-        <p:txBody>
-          <a:bodyPr/>
-          <a:lstStyle/>
-          <a:p>
-            <a:r>
-              <a:rPr lang="en-US" dirty="0"/>
-              <a:t>In the ColdFusion world, there are a few ways to create these API endpoints :</a:t>
+            <a:r>
+              <a:rPr lang="en-US" dirty="0"/>
+              <a:t> endpoints</a:t>
+            </a:r>
+          </a:p>
+          <a:p>
+            <a:pPr lvl="1"/>
+            <a:r>
+              <a:rPr lang="en-US" dirty="0"/>
+              <a:t>More on what these are in a moment.</a:t>
+            </a:r>
+          </a:p>
+          <a:p>
+            <a:r>
+              <a:rPr lang="en-US" dirty="0"/>
+              <a:t>Other common ways to exchange data over the internet would be Web Services/SOAP, </a:t>
+            </a:r>
+            <a:r>
+              <a:rPr lang="en-US" dirty="0" err="1"/>
+              <a:t>GraphQL</a:t>
+            </a:r>
+            <a:r>
+              <a:rPr lang="en-US" dirty="0"/>
+              <a:t>, binary formats (like DS), raw HTTP, WebRTC/</a:t>
+            </a:r>
+            <a:r>
+              <a:rPr lang="en-US" dirty="0" err="1"/>
+              <a:t>WebSockets</a:t>
+            </a:r>
+            <a:r>
+              <a:rPr lang="en-US" dirty="0"/>
+              <a:t>, email, FTP, etc.</a:t>
             </a:r>
           </a:p>
           <a:p>
             <a:endParaRPr lang="en-US" dirty="0"/>
           </a:p>
           <a:p>
-            <a:pPr lvl="1"/>
-            <a:r>
-              <a:rPr lang="en-US" dirty="0"/>
-              <a:t>Creating REST CFCs in ACF/</a:t>
-            </a:r>
-            <a:r>
-              <a:rPr lang="en-US" dirty="0" err="1"/>
-              <a:t>Lucee</a:t>
-            </a:r>
-            <a:r>
-              <a:rPr lang="en-US" dirty="0"/>
-              <a:t> to process data.</a:t>
-            </a:r>
-          </a:p>
-          <a:p>
-            <a:pPr lvl="2"/>
-            <a:r>
-              <a:rPr lang="en-US" dirty="0"/>
-              <a:t>Raw functionality.  You will need to own your own auth, rate limiting, etc.</a:t>
-            </a:r>
-          </a:p>
-          <a:p>
-            <a:pPr lvl="1"/>
-            <a:r>
-              <a:rPr lang="en-US" dirty="0"/>
-              <a:t>Using a framework like Taffy.io to develop your APIs</a:t>
-            </a:r>
-          </a:p>
-          <a:p>
-            <a:pPr lvl="2"/>
-            <a:r>
-              <a:rPr lang="en-US" dirty="0"/>
-              <a:t>Adds a ton of features using code.  </a:t>
-            </a:r>
-          </a:p>
-          <a:p>
-            <a:pPr lvl="1"/>
-            <a:r>
-              <a:rPr lang="en-US" dirty="0"/>
-              <a:t>Using the Adobe ColdFusion API Manager</a:t>
-            </a:r>
-          </a:p>
-          <a:p>
-            <a:pPr lvl="2"/>
-            <a:r>
-              <a:rPr lang="en-US" dirty="0"/>
-              <a:t>Bolt-on product from Adobe that helps implement a ton of features using a Web UI</a:t>
-            </a:r>
-          </a:p>
-          <a:p>
-            <a:pPr lvl="2"/>
-            <a:r>
-              <a:rPr lang="en-US" dirty="0"/>
-              <a:t>Gives access to authentication, analytics, rate limiting, auto-documentation, etc.</a:t>
-            </a:r>
+            <a:r>
+              <a:rPr lang="en-US" dirty="0"/>
+              <a:t>APIs exist a lot more than just on the web. Operating systems, programming languages, devices, etc. all rely on common API sets to allow programmers to exchange data and plug in functionality.</a:t>
+            </a:r>
+          </a:p>
+          <a:p>
+            <a:endParaRPr lang="en-US" dirty="0"/>
           </a:p>
         </p:txBody>
       </p:sp>
     </p:spTree>
     <p:extLst>
       <p:ext uri="{BB962C8B-B14F-4D97-AF65-F5344CB8AC3E}">
-        <p14:creationId xmlns:p14="http://schemas.microsoft.com/office/powerpoint/2010/main" val="3910170193"/>
+        <p14:creationId xmlns:p14="http://schemas.microsoft.com/office/powerpoint/2010/main" val="2093644613"/>
       </p:ext>
     </p:extLst>
   </p:cSld>
@@ -5889,10 +6394,10 @@
       </p:grpSpPr>
       <p:sp>
         <p:nvSpPr>
-          <p:cNvPr id="2" name="Title 1">
-            <a:extLst>
-              <a:ext uri="{FF2B5EF4-FFF2-40B4-BE49-F238E27FC236}">
-                <a16:creationId xmlns:a16="http://schemas.microsoft.com/office/drawing/2014/main" id="{B4BEE435-2C31-982A-AFB1-21754A447B89}"/>
+          <p:cNvPr id="4" name="Title 3">
+            <a:extLst>
+              <a:ext uri="{FF2B5EF4-FFF2-40B4-BE49-F238E27FC236}">
+                <a16:creationId xmlns:a16="http://schemas.microsoft.com/office/drawing/2014/main" id="{A983F497-E090-4AF7-B888-87F6569739BE}"/>
               </a:ext>
             </a:extLst>
           </p:cNvPr>
@@ -5910,119 +6415,40 @@
           <a:p>
             <a:r>
               <a:rPr lang="en-US" dirty="0"/>
-              <a:t>REST</a:t>
-            </a:r>
-          </a:p>
-        </p:txBody>
-      </p:sp>
-      <p:sp>
-        <p:nvSpPr>
-          <p:cNvPr id="3" name="Content Placeholder 2">
-            <a:extLst>
-              <a:ext uri="{FF2B5EF4-FFF2-40B4-BE49-F238E27FC236}">
-                <a16:creationId xmlns:a16="http://schemas.microsoft.com/office/drawing/2014/main" id="{4EBF1DCE-9302-5595-8535-FEA64D18126E}"/>
-              </a:ext>
-            </a:extLst>
-          </p:cNvPr>
-          <p:cNvSpPr>
-            <a:spLocks noGrp="1"/>
-          </p:cNvSpPr>
-          <p:nvPr>
-            <p:ph idx="1"/>
-          </p:nvPr>
-        </p:nvSpPr>
-        <p:spPr/>
-        <p:txBody>
-          <a:bodyPr/>
-          <a:lstStyle/>
-          <a:p>
-            <a:r>
-              <a:rPr lang="en-US" dirty="0"/>
-              <a:t>In the ColdFusion world, there are a few ways to create these API endpoints :</a:t>
-            </a:r>
-          </a:p>
-          <a:p>
-            <a:endParaRPr lang="en-US" dirty="0"/>
-          </a:p>
-          <a:p>
-            <a:pPr lvl="1"/>
-            <a:r>
-              <a:rPr lang="en-US" b="1" dirty="0">
-                <a:solidFill>
-                  <a:srgbClr val="FF0000"/>
-                </a:solidFill>
-              </a:rPr>
-              <a:t>Creating REST CFCs in ACF/</a:t>
-            </a:r>
-            <a:r>
-              <a:rPr lang="en-US" b="1" dirty="0" err="1">
-                <a:solidFill>
-                  <a:srgbClr val="FF0000"/>
-                </a:solidFill>
-              </a:rPr>
-              <a:t>Lucee</a:t>
-            </a:r>
-            <a:r>
-              <a:rPr lang="en-US" b="1" dirty="0">
-                <a:solidFill>
-                  <a:srgbClr val="FF0000"/>
-                </a:solidFill>
-              </a:rPr>
-              <a:t> to process data.</a:t>
-            </a:r>
-          </a:p>
-          <a:p>
-            <a:pPr lvl="2"/>
-            <a:r>
-              <a:rPr lang="en-US" dirty="0"/>
-              <a:t>Raw functionality.  You will need to own your own auth, rate limiting, etc.</a:t>
-            </a:r>
-          </a:p>
-          <a:p>
-            <a:pPr lvl="1"/>
-            <a:r>
-              <a:rPr lang="en-US" dirty="0"/>
-              <a:t>Using a framework like Taffy.io to develop your APIs</a:t>
-            </a:r>
-          </a:p>
-          <a:p>
-            <a:pPr lvl="2"/>
-            <a:r>
-              <a:rPr lang="en-US" dirty="0"/>
-              <a:t>Adds a ton of features using code.  </a:t>
-            </a:r>
-          </a:p>
-          <a:p>
-            <a:pPr lvl="1"/>
-            <a:r>
-              <a:rPr lang="en-US" dirty="0"/>
-              <a:t>Using the Adobe ColdFusion API Manager</a:t>
-            </a:r>
-          </a:p>
-          <a:p>
-            <a:pPr lvl="2"/>
-            <a:r>
-              <a:rPr lang="en-US" dirty="0"/>
-              <a:t>Bolt-on product from Adobe that helps implement a ton of features using a Web UI</a:t>
-            </a:r>
-          </a:p>
-          <a:p>
-            <a:pPr lvl="2"/>
-            <a:r>
-              <a:rPr lang="en-US" dirty="0"/>
-              <a:t>Gives access to authentication, analytics, rate limiting, auto-documentation, etc.</a:t>
-            </a:r>
-          </a:p>
-          <a:p>
-            <a:pPr lvl="2"/>
-            <a:endParaRPr lang="en-US" dirty="0"/>
+              <a:t>What is REST?</a:t>
+            </a:r>
+          </a:p>
+        </p:txBody>
+      </p:sp>
+      <p:sp>
+        <p:nvSpPr>
+          <p:cNvPr id="5" name="Text Placeholder 4">
+            <a:extLst>
+              <a:ext uri="{FF2B5EF4-FFF2-40B4-BE49-F238E27FC236}">
+                <a16:creationId xmlns:a16="http://schemas.microsoft.com/office/drawing/2014/main" id="{5751667A-D992-4C0F-991E-5A592EC8FA57}"/>
+              </a:ext>
+            </a:extLst>
+          </p:cNvPr>
+          <p:cNvSpPr>
+            <a:spLocks noGrp="1"/>
+          </p:cNvSpPr>
+          <p:nvPr>
+            <p:ph type="body" idx="1"/>
+          </p:nvPr>
+        </p:nvSpPr>
+        <p:spPr/>
+        <p:txBody>
+          <a:bodyPr/>
+          <a:lstStyle/>
+          <a:p>
+            <a:endParaRPr lang="en-US"/>
           </a:p>
         </p:txBody>
       </p:sp>
     </p:spTree>
     <p:extLst>
       <p:ext uri="{BB962C8B-B14F-4D97-AF65-F5344CB8AC3E}">
-        <p14:creationId xmlns:p14="http://schemas.microsoft.com/office/powerpoint/2010/main" val="4163620947"/>
+        <p14:creationId xmlns:p14="http://schemas.microsoft.com/office/powerpoint/2010/main" val="2994410301"/>
       </p:ext>
     </p:extLst>
   </p:cSld>
@@ -6051,10 +6477,10 @@
       </p:grpSpPr>
       <p:sp>
         <p:nvSpPr>
-          <p:cNvPr id="2" name="Title 1">
-            <a:extLst>
-              <a:ext uri="{FF2B5EF4-FFF2-40B4-BE49-F238E27FC236}">
-                <a16:creationId xmlns:a16="http://schemas.microsoft.com/office/drawing/2014/main" id="{E79531E2-E51B-0BCC-FDC6-F45B56582D0D}"/>
+          <p:cNvPr id="4" name="Title 3">
+            <a:extLst>
+              <a:ext uri="{FF2B5EF4-FFF2-40B4-BE49-F238E27FC236}">
+                <a16:creationId xmlns:a16="http://schemas.microsoft.com/office/drawing/2014/main" id="{51082C4D-0085-350F-81C2-D7FBE3F6AEB3}"/>
               </a:ext>
             </a:extLst>
           </p:cNvPr>
@@ -6072,52 +6498,79 @@
           <a:p>
             <a:r>
               <a:rPr lang="en-US" dirty="0"/>
+              <a:t>What is REST</a:t>
+            </a:r>
+          </a:p>
+        </p:txBody>
+      </p:sp>
+      <p:sp>
+        <p:nvSpPr>
+          <p:cNvPr id="5" name="Content Placeholder 4">
+            <a:extLst>
+              <a:ext uri="{FF2B5EF4-FFF2-40B4-BE49-F238E27FC236}">
+                <a16:creationId xmlns:a16="http://schemas.microsoft.com/office/drawing/2014/main" id="{745AD351-73B5-CE48-DE9F-9B98E76F02DB}"/>
+              </a:ext>
+            </a:extLst>
+          </p:cNvPr>
+          <p:cNvSpPr>
+            <a:spLocks noGrp="1"/>
+          </p:cNvSpPr>
+          <p:nvPr>
+            <p:ph idx="1"/>
+          </p:nvPr>
+        </p:nvSpPr>
+        <p:spPr/>
+        <p:txBody>
+          <a:bodyPr/>
+          <a:lstStyle/>
+          <a:p>
+            <a:r>
+              <a:rPr lang="en-US" b="1" dirty="0"/>
               <a:t>REST</a:t>
             </a:r>
-          </a:p>
-        </p:txBody>
-      </p:sp>
-      <p:sp>
-        <p:nvSpPr>
-          <p:cNvPr id="3" name="Content Placeholder 2">
-            <a:extLst>
-              <a:ext uri="{FF2B5EF4-FFF2-40B4-BE49-F238E27FC236}">
-                <a16:creationId xmlns:a16="http://schemas.microsoft.com/office/drawing/2014/main" id="{836E2FCB-47B2-46ED-7E3C-9FB70D262F99}"/>
-              </a:ext>
-            </a:extLst>
-          </p:cNvPr>
-          <p:cNvSpPr>
-            <a:spLocks noGrp="1"/>
-          </p:cNvSpPr>
-          <p:nvPr>
-            <p:ph idx="1"/>
-          </p:nvPr>
-        </p:nvSpPr>
-        <p:spPr/>
-        <p:txBody>
-          <a:bodyPr/>
-          <a:lstStyle/>
-          <a:p>
-            <a:r>
-              <a:rPr lang="en-US" dirty="0"/>
-              <a:t>Exploring what REST communications look like :</a:t>
+            <a:r>
+              <a:rPr lang="en-US" dirty="0"/>
+              <a:t> = Representational State Transfer</a:t>
             </a:r>
           </a:p>
           <a:p>
             <a:pPr lvl="1"/>
             <a:r>
-              <a:rPr lang="en-US" dirty="0">
-                <a:hlinkClick r:id="rId2"/>
-              </a:rPr>
-              <a:t>https://localhost/demo1/</a:t>
-            </a:r>
-            <a:endParaRPr lang="en-US" dirty="0"/>
+              <a:rPr lang="en-US" dirty="0"/>
+              <a:t>Using the metadata of an HTTP call to convey data and select interfaces.</a:t>
+            </a:r>
+          </a:p>
+          <a:p>
+            <a:pPr lvl="1"/>
+            <a:r>
+              <a:rPr lang="en-US" dirty="0"/>
+              <a:t>Used for machine-to-machine data transfers in a normalized way.</a:t>
+            </a:r>
           </a:p>
           <a:p>
             <a:pPr lvl="1"/>
             <a:endParaRPr lang="en-US" dirty="0"/>
           </a:p>
           <a:p>
+            <a:pPr lvl="1"/>
+            <a:r>
+              <a:rPr lang="en-US" dirty="0"/>
+              <a:t>Unlike SOAP, RPC and other communication methods, there is no ‘official’ standard to follow or RFC to define how it is designed to work.  It’s just the thought of using the existing protocols.</a:t>
+            </a:r>
+          </a:p>
+          <a:p>
+            <a:pPr lvl="1"/>
+            <a:endParaRPr lang="en-US" dirty="0"/>
+          </a:p>
+          <a:p>
+            <a:pPr lvl="1"/>
+            <a:r>
+              <a:rPr lang="en-US" dirty="0"/>
+              <a:t>Generally used to expose APIs from your applications to either be consumed by your site or to express data to others.</a:t>
+            </a:r>
+          </a:p>
+          <a:p>
+            <a:pPr lvl="1"/>
             <a:endParaRPr lang="en-US" dirty="0"/>
           </a:p>
         </p:txBody>
@@ -6125,7 +6578,7 @@
     </p:spTree>
     <p:extLst>
       <p:ext uri="{BB962C8B-B14F-4D97-AF65-F5344CB8AC3E}">
-        <p14:creationId xmlns:p14="http://schemas.microsoft.com/office/powerpoint/2010/main" val="4190369622"/>
+        <p14:creationId xmlns:p14="http://schemas.microsoft.com/office/powerpoint/2010/main" val="124280322"/>
       </p:ext>
     </p:extLst>
   </p:cSld>

</xml_diff>

<commit_message>
Adding demo 0 for examples on how to consume REST endpoints with cfhttp
</commit_message>
<xml_diff>
--- a/HawaiiCFUG - APIs.pptx
+++ b/HawaiiCFUG - APIs.pptx
@@ -15,27 +15,31 @@
     <p:sldId id="260" r:id="rId9"/>
     <p:sldId id="261" r:id="rId10"/>
     <p:sldId id="262" r:id="rId11"/>
-    <p:sldId id="263" r:id="rId12"/>
-    <p:sldId id="264" r:id="rId13"/>
-    <p:sldId id="265" r:id="rId14"/>
-    <p:sldId id="266" r:id="rId15"/>
-    <p:sldId id="268" r:id="rId16"/>
-    <p:sldId id="267" r:id="rId17"/>
-    <p:sldId id="269" r:id="rId18"/>
-    <p:sldId id="270" r:id="rId19"/>
-    <p:sldId id="271" r:id="rId20"/>
-    <p:sldId id="272" r:id="rId21"/>
-    <p:sldId id="273" r:id="rId22"/>
-    <p:sldId id="274" r:id="rId23"/>
-    <p:sldId id="275" r:id="rId24"/>
-    <p:sldId id="276" r:id="rId25"/>
-    <p:sldId id="277" r:id="rId26"/>
-    <p:sldId id="278" r:id="rId27"/>
-    <p:sldId id="279" r:id="rId28"/>
-    <p:sldId id="280" r:id="rId29"/>
-    <p:sldId id="281" r:id="rId30"/>
-    <p:sldId id="282" r:id="rId31"/>
-    <p:sldId id="285" r:id="rId32"/>
+    <p:sldId id="290" r:id="rId12"/>
+    <p:sldId id="291" r:id="rId13"/>
+    <p:sldId id="266" r:id="rId14"/>
+    <p:sldId id="292" r:id="rId15"/>
+    <p:sldId id="293" r:id="rId16"/>
+    <p:sldId id="263" r:id="rId17"/>
+    <p:sldId id="264" r:id="rId18"/>
+    <p:sldId id="265" r:id="rId19"/>
+    <p:sldId id="268" r:id="rId20"/>
+    <p:sldId id="267" r:id="rId21"/>
+    <p:sldId id="269" r:id="rId22"/>
+    <p:sldId id="270" r:id="rId23"/>
+    <p:sldId id="271" r:id="rId24"/>
+    <p:sldId id="272" r:id="rId25"/>
+    <p:sldId id="273" r:id="rId26"/>
+    <p:sldId id="274" r:id="rId27"/>
+    <p:sldId id="275" r:id="rId28"/>
+    <p:sldId id="276" r:id="rId29"/>
+    <p:sldId id="277" r:id="rId30"/>
+    <p:sldId id="278" r:id="rId31"/>
+    <p:sldId id="279" r:id="rId32"/>
+    <p:sldId id="280" r:id="rId33"/>
+    <p:sldId id="281" r:id="rId34"/>
+    <p:sldId id="282" r:id="rId35"/>
+    <p:sldId id="285" r:id="rId36"/>
   </p:sldIdLst>
   <p:sldSz cx="12192000" cy="6858000"/>
   <p:notesSz cx="6858000" cy="9144000"/>
@@ -3040,10 +3044,10 @@
       </p:grpSpPr>
       <p:sp>
         <p:nvSpPr>
-          <p:cNvPr id="2" name="Title 1">
-            <a:extLst>
-              <a:ext uri="{FF2B5EF4-FFF2-40B4-BE49-F238E27FC236}">
-                <a16:creationId xmlns:a16="http://schemas.microsoft.com/office/drawing/2014/main" id="{B4BEE435-2C31-982A-AFB1-21754A447B89}"/>
+          <p:cNvPr id="4" name="Title 3">
+            <a:extLst>
+              <a:ext uri="{FF2B5EF4-FFF2-40B4-BE49-F238E27FC236}">
+                <a16:creationId xmlns:a16="http://schemas.microsoft.com/office/drawing/2014/main" id="{D60A620F-9149-016C-44CA-24B79686EBFC}"/>
               </a:ext>
             </a:extLst>
           </p:cNvPr>
@@ -3061,103 +3065,40 @@
           <a:p>
             <a:r>
               <a:rPr lang="en-US" dirty="0"/>
-              <a:t>REST</a:t>
-            </a:r>
-          </a:p>
-        </p:txBody>
-      </p:sp>
-      <p:sp>
-        <p:nvSpPr>
-          <p:cNvPr id="3" name="Content Placeholder 2">
-            <a:extLst>
-              <a:ext uri="{FF2B5EF4-FFF2-40B4-BE49-F238E27FC236}">
-                <a16:creationId xmlns:a16="http://schemas.microsoft.com/office/drawing/2014/main" id="{4EBF1DCE-9302-5595-8535-FEA64D18126E}"/>
-              </a:ext>
-            </a:extLst>
-          </p:cNvPr>
-          <p:cNvSpPr>
-            <a:spLocks noGrp="1"/>
-          </p:cNvSpPr>
-          <p:nvPr>
-            <p:ph idx="1"/>
-          </p:nvPr>
-        </p:nvSpPr>
-        <p:spPr/>
-        <p:txBody>
-          <a:bodyPr/>
-          <a:lstStyle/>
-          <a:p>
-            <a:r>
-              <a:rPr lang="en-US" dirty="0"/>
-              <a:t>In the ColdFusion world, there are a few ways to create these API endpoints :</a:t>
-            </a:r>
-          </a:p>
-          <a:p>
-            <a:endParaRPr lang="en-US" dirty="0"/>
-          </a:p>
-          <a:p>
-            <a:pPr lvl="1"/>
-            <a:r>
-              <a:rPr lang="en-US" dirty="0"/>
-              <a:t>Creating REST CFCs in ACF/</a:t>
-            </a:r>
-            <a:r>
-              <a:rPr lang="en-US" dirty="0" err="1"/>
-              <a:t>Lucee</a:t>
-            </a:r>
-            <a:r>
-              <a:rPr lang="en-US" dirty="0"/>
-              <a:t> to process data.</a:t>
-            </a:r>
-          </a:p>
-          <a:p>
-            <a:pPr lvl="2"/>
-            <a:r>
-              <a:rPr lang="en-US" dirty="0"/>
-              <a:t>Raw functionality.  You will need to own your own auth, rate limiting, etc.</a:t>
-            </a:r>
-          </a:p>
-          <a:p>
-            <a:pPr lvl="1"/>
-            <a:r>
-              <a:rPr lang="en-US" dirty="0"/>
-              <a:t>Using a framework like Taffy.io to develop your APIs</a:t>
-            </a:r>
-          </a:p>
-          <a:p>
-            <a:pPr lvl="2"/>
-            <a:r>
-              <a:rPr lang="en-US" dirty="0"/>
-              <a:t>Adds a ton of features using code.  </a:t>
-            </a:r>
-          </a:p>
-          <a:p>
-            <a:pPr lvl="1"/>
-            <a:r>
-              <a:rPr lang="en-US" dirty="0"/>
-              <a:t>Using the Adobe ColdFusion API Manager</a:t>
-            </a:r>
-          </a:p>
-          <a:p>
-            <a:pPr lvl="2"/>
-            <a:r>
-              <a:rPr lang="en-US" dirty="0"/>
-              <a:t>Bolt-on product from Adobe that helps implement a ton of features using a Web UI</a:t>
-            </a:r>
-          </a:p>
-          <a:p>
-            <a:pPr lvl="2"/>
-            <a:r>
-              <a:rPr lang="en-US" dirty="0"/>
-              <a:t>Gives access to authentication, analytics, rate limiting, auto-documentation, etc.</a:t>
-            </a:r>
+              <a:t>Consuming REST endpoints in CFML</a:t>
+            </a:r>
+          </a:p>
+        </p:txBody>
+      </p:sp>
+      <p:sp>
+        <p:nvSpPr>
+          <p:cNvPr id="5" name="Text Placeholder 4">
+            <a:extLst>
+              <a:ext uri="{FF2B5EF4-FFF2-40B4-BE49-F238E27FC236}">
+                <a16:creationId xmlns:a16="http://schemas.microsoft.com/office/drawing/2014/main" id="{40654A6C-507B-6FD8-4085-3EF32EF7698F}"/>
+              </a:ext>
+            </a:extLst>
+          </p:cNvPr>
+          <p:cNvSpPr>
+            <a:spLocks noGrp="1"/>
+          </p:cNvSpPr>
+          <p:nvPr>
+            <p:ph type="body" idx="1"/>
+          </p:nvPr>
+        </p:nvSpPr>
+        <p:spPr/>
+        <p:txBody>
+          <a:bodyPr/>
+          <a:lstStyle/>
+          <a:p>
+            <a:endParaRPr lang="en-US"/>
           </a:p>
         </p:txBody>
       </p:sp>
     </p:spTree>
     <p:extLst>
       <p:ext uri="{BB962C8B-B14F-4D97-AF65-F5344CB8AC3E}">
-        <p14:creationId xmlns:p14="http://schemas.microsoft.com/office/powerpoint/2010/main" val="3910170193"/>
+        <p14:creationId xmlns:p14="http://schemas.microsoft.com/office/powerpoint/2010/main" val="3050101496"/>
       </p:ext>
     </p:extLst>
   </p:cSld>
@@ -3186,10 +3127,10 @@
       </p:grpSpPr>
       <p:sp>
         <p:nvSpPr>
-          <p:cNvPr id="2" name="Title 1">
-            <a:extLst>
-              <a:ext uri="{FF2B5EF4-FFF2-40B4-BE49-F238E27FC236}">
-                <a16:creationId xmlns:a16="http://schemas.microsoft.com/office/drawing/2014/main" id="{B4BEE435-2C31-982A-AFB1-21754A447B89}"/>
+          <p:cNvPr id="4" name="Title 3">
+            <a:extLst>
+              <a:ext uri="{FF2B5EF4-FFF2-40B4-BE49-F238E27FC236}">
+                <a16:creationId xmlns:a16="http://schemas.microsoft.com/office/drawing/2014/main" id="{E2E252E3-4F78-7B89-5CEE-B0244DB607AA}"/>
               </a:ext>
             </a:extLst>
           </p:cNvPr>
@@ -3207,17 +3148,17 @@
           <a:p>
             <a:r>
               <a:rPr lang="en-US" dirty="0"/>
-              <a:t>REST</a:t>
-            </a:r>
-          </a:p>
-        </p:txBody>
-      </p:sp>
-      <p:sp>
-        <p:nvSpPr>
-          <p:cNvPr id="3" name="Content Placeholder 2">
-            <a:extLst>
-              <a:ext uri="{FF2B5EF4-FFF2-40B4-BE49-F238E27FC236}">
-                <a16:creationId xmlns:a16="http://schemas.microsoft.com/office/drawing/2014/main" id="{4EBF1DCE-9302-5595-8535-FEA64D18126E}"/>
+              <a:t>Consuming REST endpoints in CFML</a:t>
+            </a:r>
+          </a:p>
+        </p:txBody>
+      </p:sp>
+      <p:sp>
+        <p:nvSpPr>
+          <p:cNvPr id="5" name="Content Placeholder 4">
+            <a:extLst>
+              <a:ext uri="{FF2B5EF4-FFF2-40B4-BE49-F238E27FC236}">
+                <a16:creationId xmlns:a16="http://schemas.microsoft.com/office/drawing/2014/main" id="{29EB33E6-88C7-D40C-AC07-5D7DA506C10F}"/>
               </a:ext>
             </a:extLst>
           </p:cNvPr>
@@ -3235,83 +3176,70 @@
           <a:p>
             <a:r>
               <a:rPr lang="en-US" dirty="0"/>
-              <a:t>In the ColdFusion world, there are a few ways to create these API endpoints :</a:t>
-            </a:r>
-          </a:p>
-          <a:p>
-            <a:endParaRPr lang="en-US" dirty="0"/>
+              <a:t>Consuming REST endpoints from other servers or services usually involves an HTTP call</a:t>
+            </a:r>
           </a:p>
           <a:p>
             <a:pPr lvl="1"/>
             <a:r>
-              <a:rPr lang="en-US" b="1" dirty="0">
-                <a:solidFill>
-                  <a:srgbClr val="FF0000"/>
-                </a:solidFill>
-              </a:rPr>
-              <a:t>Creating REST CFCs in ACF/</a:t>
-            </a:r>
-            <a:r>
-              <a:rPr lang="en-US" b="1" dirty="0" err="1">
-                <a:solidFill>
-                  <a:srgbClr val="FF0000"/>
-                </a:solidFill>
-              </a:rPr>
-              <a:t>Lucee</a:t>
-            </a:r>
-            <a:r>
-              <a:rPr lang="en-US" b="1" dirty="0">
-                <a:solidFill>
-                  <a:srgbClr val="FF0000"/>
-                </a:solidFill>
-              </a:rPr>
-              <a:t> to process data.</a:t>
+              <a:rPr lang="en-US" dirty="0"/>
+              <a:t>Turns out, we have </a:t>
+            </a:r>
+            <a:r>
+              <a:rPr lang="en-US" b="1" i="1" dirty="0"/>
+              <a:t>&lt;</a:t>
+            </a:r>
+            <a:r>
+              <a:rPr lang="en-US" b="1" i="1" dirty="0" err="1"/>
+              <a:t>cfhttp</a:t>
+            </a:r>
+            <a:r>
+              <a:rPr lang="en-US" b="1" i="1" dirty="0"/>
+              <a:t>&gt; </a:t>
+            </a:r>
+            <a:r>
+              <a:rPr lang="en-US" dirty="0"/>
+              <a:t>!</a:t>
+            </a:r>
+          </a:p>
+          <a:p>
+            <a:pPr lvl="1"/>
+            <a:r>
+              <a:rPr lang="en-US" dirty="0"/>
+              <a:t>Every REST endpoint is slightly different, so you will need to do some sleuthing on how to get them to work</a:t>
             </a:r>
           </a:p>
           <a:p>
             <a:pPr lvl="2"/>
             <a:r>
               <a:rPr lang="en-US" dirty="0"/>
-              <a:t>Raw functionality.  You will need to own your own auth, rate limiting, etc.</a:t>
+              <a:t>I usually use </a:t>
+            </a:r>
+            <a:r>
+              <a:rPr lang="en-US" dirty="0" err="1"/>
+              <a:t>POSTman</a:t>
+            </a:r>
+            <a:r>
+              <a:rPr lang="en-US" dirty="0"/>
+              <a:t> to get a working call first, then implement what I learned there to build my code.</a:t>
             </a:r>
           </a:p>
           <a:p>
             <a:pPr lvl="1"/>
             <a:r>
               <a:rPr lang="en-US" dirty="0"/>
-              <a:t>Using a framework like Taffy.io to develop your APIs</a:t>
+              <a:t>Things to pay attention to:</a:t>
             </a:r>
           </a:p>
           <a:p>
             <a:pPr lvl="2"/>
             <a:r>
               <a:rPr lang="en-US" dirty="0"/>
-              <a:t>Adds a ton of features using code.  </a:t>
+              <a:t>Accept, Auth Tokens, Required headers, form or raw data, etc.</a:t>
             </a:r>
           </a:p>
           <a:p>
             <a:pPr lvl="1"/>
-            <a:r>
-              <a:rPr lang="en-US" dirty="0"/>
-              <a:t>Using the Adobe ColdFusion API Manager</a:t>
-            </a:r>
-          </a:p>
-          <a:p>
-            <a:pPr lvl="2"/>
-            <a:r>
-              <a:rPr lang="en-US" dirty="0"/>
-              <a:t>Bolt-on product from Adobe that helps implement a ton of features using a Web UI</a:t>
-            </a:r>
-          </a:p>
-          <a:p>
-            <a:pPr lvl="2"/>
-            <a:r>
-              <a:rPr lang="en-US" dirty="0"/>
-              <a:t>Gives access to authentication, analytics, rate limiting, auto-documentation, etc.</a:t>
-            </a:r>
-          </a:p>
-          <a:p>
-            <a:pPr lvl="2"/>
             <a:endParaRPr lang="en-US" dirty="0"/>
           </a:p>
         </p:txBody>
@@ -3319,7 +3247,7 @@
     </p:spTree>
     <p:extLst>
       <p:ext uri="{BB962C8B-B14F-4D97-AF65-F5344CB8AC3E}">
-        <p14:creationId xmlns:p14="http://schemas.microsoft.com/office/powerpoint/2010/main" val="4163620947"/>
+        <p14:creationId xmlns:p14="http://schemas.microsoft.com/office/powerpoint/2010/main" val="992720236"/>
       </p:ext>
     </p:extLst>
   </p:cSld>
@@ -3330,109 +3258,6 @@
 </file>
 
 <file path=ppt/slides/slide13.xml><?xml version="1.0" encoding="utf-8"?>
-<p:sld xmlns:a="http://schemas.openxmlformats.org/drawingml/2006/main" xmlns:r="http://schemas.openxmlformats.org/officeDocument/2006/relationships" xmlns:p="http://schemas.openxmlformats.org/presentationml/2006/main">
-  <p:cSld>
-    <p:spTree>
-      <p:nvGrpSpPr>
-        <p:cNvPr id="1" name=""/>
-        <p:cNvGrpSpPr/>
-        <p:nvPr/>
-      </p:nvGrpSpPr>
-      <p:grpSpPr>
-        <a:xfrm>
-          <a:off x="0" y="0"/>
-          <a:ext cx="0" cy="0"/>
-          <a:chOff x="0" y="0"/>
-          <a:chExt cx="0" cy="0"/>
-        </a:xfrm>
-      </p:grpSpPr>
-      <p:sp>
-        <p:nvSpPr>
-          <p:cNvPr id="2" name="Title 1">
-            <a:extLst>
-              <a:ext uri="{FF2B5EF4-FFF2-40B4-BE49-F238E27FC236}">
-                <a16:creationId xmlns:a16="http://schemas.microsoft.com/office/drawing/2014/main" id="{E79531E2-E51B-0BCC-FDC6-F45B56582D0D}"/>
-              </a:ext>
-            </a:extLst>
-          </p:cNvPr>
-          <p:cNvSpPr>
-            <a:spLocks noGrp="1"/>
-          </p:cNvSpPr>
-          <p:nvPr>
-            <p:ph type="title"/>
-          </p:nvPr>
-        </p:nvSpPr>
-        <p:spPr/>
-        <p:txBody>
-          <a:bodyPr/>
-          <a:lstStyle/>
-          <a:p>
-            <a:r>
-              <a:rPr lang="en-US" dirty="0"/>
-              <a:t>REST</a:t>
-            </a:r>
-          </a:p>
-        </p:txBody>
-      </p:sp>
-      <p:sp>
-        <p:nvSpPr>
-          <p:cNvPr id="3" name="Content Placeholder 2">
-            <a:extLst>
-              <a:ext uri="{FF2B5EF4-FFF2-40B4-BE49-F238E27FC236}">
-                <a16:creationId xmlns:a16="http://schemas.microsoft.com/office/drawing/2014/main" id="{836E2FCB-47B2-46ED-7E3C-9FB70D262F99}"/>
-              </a:ext>
-            </a:extLst>
-          </p:cNvPr>
-          <p:cNvSpPr>
-            <a:spLocks noGrp="1"/>
-          </p:cNvSpPr>
-          <p:nvPr>
-            <p:ph idx="1"/>
-          </p:nvPr>
-        </p:nvSpPr>
-        <p:spPr/>
-        <p:txBody>
-          <a:bodyPr/>
-          <a:lstStyle/>
-          <a:p>
-            <a:r>
-              <a:rPr lang="en-US" dirty="0"/>
-              <a:t>Exploring what REST communications look like :</a:t>
-            </a:r>
-          </a:p>
-          <a:p>
-            <a:pPr lvl="1"/>
-            <a:r>
-              <a:rPr lang="en-US" dirty="0">
-                <a:hlinkClick r:id="rId2"/>
-              </a:rPr>
-              <a:t>https://localhost/demo1/</a:t>
-            </a:r>
-            <a:endParaRPr lang="en-US" dirty="0"/>
-          </a:p>
-          <a:p>
-            <a:pPr lvl="1"/>
-            <a:endParaRPr lang="en-US" dirty="0"/>
-          </a:p>
-          <a:p>
-            <a:endParaRPr lang="en-US" dirty="0"/>
-          </a:p>
-        </p:txBody>
-      </p:sp>
-    </p:spTree>
-    <p:extLst>
-      <p:ext uri="{BB962C8B-B14F-4D97-AF65-F5344CB8AC3E}">
-        <p14:creationId xmlns:p14="http://schemas.microsoft.com/office/powerpoint/2010/main" val="4190369622"/>
-      </p:ext>
-    </p:extLst>
-  </p:cSld>
-  <p:clrMapOvr>
-    <a:masterClrMapping/>
-  </p:clrMapOvr>
-</p:sld>
-</file>
-
-<file path=ppt/slides/slide14.xml><?xml version="1.0" encoding="utf-8"?>
 <p:sld xmlns:a="http://schemas.openxmlformats.org/drawingml/2006/main" xmlns:r="http://schemas.openxmlformats.org/officeDocument/2006/relationships" xmlns:p="http://schemas.openxmlformats.org/presentationml/2006/main">
   <p:cSld>
     <p:spTree>
@@ -3595,6 +3420,104 @@
 </p:sld>
 </file>
 
+<file path=ppt/slides/slide14.xml><?xml version="1.0" encoding="utf-8"?>
+<p:sld xmlns:a="http://schemas.openxmlformats.org/drawingml/2006/main" xmlns:r="http://schemas.openxmlformats.org/officeDocument/2006/relationships" xmlns:p="http://schemas.openxmlformats.org/presentationml/2006/main">
+  <p:cSld>
+    <p:spTree>
+      <p:nvGrpSpPr>
+        <p:cNvPr id="1" name=""/>
+        <p:cNvGrpSpPr/>
+        <p:nvPr/>
+      </p:nvGrpSpPr>
+      <p:grpSpPr>
+        <a:xfrm>
+          <a:off x="0" y="0"/>
+          <a:ext cx="0" cy="0"/>
+          <a:chOff x="0" y="0"/>
+          <a:chExt cx="0" cy="0"/>
+        </a:xfrm>
+      </p:grpSpPr>
+      <p:sp>
+        <p:nvSpPr>
+          <p:cNvPr id="2" name="Title 1">
+            <a:extLst>
+              <a:ext uri="{FF2B5EF4-FFF2-40B4-BE49-F238E27FC236}">
+                <a16:creationId xmlns:a16="http://schemas.microsoft.com/office/drawing/2014/main" id="{3E320F64-02AE-A5E7-CC32-1259A69664A7}"/>
+              </a:ext>
+            </a:extLst>
+          </p:cNvPr>
+          <p:cNvSpPr>
+            <a:spLocks noGrp="1"/>
+          </p:cNvSpPr>
+          <p:nvPr>
+            <p:ph type="title"/>
+          </p:nvPr>
+        </p:nvSpPr>
+        <p:spPr/>
+        <p:txBody>
+          <a:bodyPr/>
+          <a:lstStyle/>
+          <a:p>
+            <a:r>
+              <a:rPr lang="en-US" dirty="0"/>
+              <a:t>Consuming REST endpoints in CFML</a:t>
+            </a:r>
+          </a:p>
+        </p:txBody>
+      </p:sp>
+      <p:sp>
+        <p:nvSpPr>
+          <p:cNvPr id="3" name="Content Placeholder 2">
+            <a:extLst>
+              <a:ext uri="{FF2B5EF4-FFF2-40B4-BE49-F238E27FC236}">
+                <a16:creationId xmlns:a16="http://schemas.microsoft.com/office/drawing/2014/main" id="{13C07E6D-540D-D0D2-1537-357D2AAE45A1}"/>
+              </a:ext>
+            </a:extLst>
+          </p:cNvPr>
+          <p:cNvSpPr>
+            <a:spLocks noGrp="1"/>
+          </p:cNvSpPr>
+          <p:nvPr>
+            <p:ph idx="1"/>
+          </p:nvPr>
+        </p:nvSpPr>
+        <p:spPr/>
+        <p:txBody>
+          <a:bodyPr/>
+          <a:lstStyle/>
+          <a:p>
+            <a:r>
+              <a:rPr lang="en-US" dirty="0">
+                <a:hlinkClick r:id="rId2"/>
+              </a:rPr>
+              <a:t>https://localhost/demo0/</a:t>
+            </a:r>
+            <a:endParaRPr lang="en-US" dirty="0"/>
+          </a:p>
+          <a:p>
+            <a:endParaRPr lang="en-US" dirty="0"/>
+          </a:p>
+          <a:p>
+            <a:pPr marL="0" indent="0">
+              <a:buNone/>
+            </a:pPr>
+            <a:endParaRPr lang="en-US" dirty="0"/>
+          </a:p>
+        </p:txBody>
+      </p:sp>
+    </p:spTree>
+    <p:extLst>
+      <p:ext uri="{BB962C8B-B14F-4D97-AF65-F5344CB8AC3E}">
+        <p14:creationId xmlns:p14="http://schemas.microsoft.com/office/powerpoint/2010/main" val="1714882164"/>
+      </p:ext>
+    </p:extLst>
+  </p:cSld>
+  <p:clrMapOvr>
+    <a:masterClrMapping/>
+  </p:clrMapOvr>
+</p:sld>
+</file>
+
 <file path=ppt/slides/slide15.xml><?xml version="1.0" encoding="utf-8"?>
 <p:sld xmlns:a="http://schemas.openxmlformats.org/drawingml/2006/main" xmlns:r="http://schemas.openxmlformats.org/officeDocument/2006/relationships" xmlns:p="http://schemas.openxmlformats.org/presentationml/2006/main">
   <p:cSld>
@@ -3617,6 +3540,500 @@
           <p:cNvPr id="4" name="Title 3">
             <a:extLst>
               <a:ext uri="{FF2B5EF4-FFF2-40B4-BE49-F238E27FC236}">
+                <a16:creationId xmlns:a16="http://schemas.microsoft.com/office/drawing/2014/main" id="{AD4AC043-8F89-F145-03DC-6EB08D508B8A}"/>
+              </a:ext>
+            </a:extLst>
+          </p:cNvPr>
+          <p:cNvSpPr>
+            <a:spLocks noGrp="1"/>
+          </p:cNvSpPr>
+          <p:nvPr>
+            <p:ph type="title"/>
+          </p:nvPr>
+        </p:nvSpPr>
+        <p:spPr/>
+        <p:txBody>
+          <a:bodyPr/>
+          <a:lstStyle/>
+          <a:p>
+            <a:r>
+              <a:rPr lang="en-US" dirty="0"/>
+              <a:t>Building REST endpoints in CFML</a:t>
+            </a:r>
+          </a:p>
+        </p:txBody>
+      </p:sp>
+      <p:sp>
+        <p:nvSpPr>
+          <p:cNvPr id="5" name="Text Placeholder 4">
+            <a:extLst>
+              <a:ext uri="{FF2B5EF4-FFF2-40B4-BE49-F238E27FC236}">
+                <a16:creationId xmlns:a16="http://schemas.microsoft.com/office/drawing/2014/main" id="{0FFBDA3E-00E7-97B6-4562-51899ABA13AF}"/>
+              </a:ext>
+            </a:extLst>
+          </p:cNvPr>
+          <p:cNvSpPr>
+            <a:spLocks noGrp="1"/>
+          </p:cNvSpPr>
+          <p:nvPr>
+            <p:ph type="body" idx="1"/>
+          </p:nvPr>
+        </p:nvSpPr>
+        <p:spPr/>
+        <p:txBody>
+          <a:bodyPr/>
+          <a:lstStyle/>
+          <a:p>
+            <a:endParaRPr lang="en-US"/>
+          </a:p>
+        </p:txBody>
+      </p:sp>
+    </p:spTree>
+    <p:extLst>
+      <p:ext uri="{BB962C8B-B14F-4D97-AF65-F5344CB8AC3E}">
+        <p14:creationId xmlns:p14="http://schemas.microsoft.com/office/powerpoint/2010/main" val="1466567058"/>
+      </p:ext>
+    </p:extLst>
+  </p:cSld>
+  <p:clrMapOvr>
+    <a:masterClrMapping/>
+  </p:clrMapOvr>
+</p:sld>
+</file>
+
+<file path=ppt/slides/slide16.xml><?xml version="1.0" encoding="utf-8"?>
+<p:sld xmlns:a="http://schemas.openxmlformats.org/drawingml/2006/main" xmlns:r="http://schemas.openxmlformats.org/officeDocument/2006/relationships" xmlns:p="http://schemas.openxmlformats.org/presentationml/2006/main">
+  <p:cSld>
+    <p:spTree>
+      <p:nvGrpSpPr>
+        <p:cNvPr id="1" name=""/>
+        <p:cNvGrpSpPr/>
+        <p:nvPr/>
+      </p:nvGrpSpPr>
+      <p:grpSpPr>
+        <a:xfrm>
+          <a:off x="0" y="0"/>
+          <a:ext cx="0" cy="0"/>
+          <a:chOff x="0" y="0"/>
+          <a:chExt cx="0" cy="0"/>
+        </a:xfrm>
+      </p:grpSpPr>
+      <p:sp>
+        <p:nvSpPr>
+          <p:cNvPr id="2" name="Title 1">
+            <a:extLst>
+              <a:ext uri="{FF2B5EF4-FFF2-40B4-BE49-F238E27FC236}">
+                <a16:creationId xmlns:a16="http://schemas.microsoft.com/office/drawing/2014/main" id="{B4BEE435-2C31-982A-AFB1-21754A447B89}"/>
+              </a:ext>
+            </a:extLst>
+          </p:cNvPr>
+          <p:cNvSpPr>
+            <a:spLocks noGrp="1"/>
+          </p:cNvSpPr>
+          <p:nvPr>
+            <p:ph type="title"/>
+          </p:nvPr>
+        </p:nvSpPr>
+        <p:spPr/>
+        <p:txBody>
+          <a:bodyPr/>
+          <a:lstStyle/>
+          <a:p>
+            <a:r>
+              <a:rPr lang="en-US" dirty="0"/>
+              <a:t>REST</a:t>
+            </a:r>
+          </a:p>
+        </p:txBody>
+      </p:sp>
+      <p:sp>
+        <p:nvSpPr>
+          <p:cNvPr id="3" name="Content Placeholder 2">
+            <a:extLst>
+              <a:ext uri="{FF2B5EF4-FFF2-40B4-BE49-F238E27FC236}">
+                <a16:creationId xmlns:a16="http://schemas.microsoft.com/office/drawing/2014/main" id="{4EBF1DCE-9302-5595-8535-FEA64D18126E}"/>
+              </a:ext>
+            </a:extLst>
+          </p:cNvPr>
+          <p:cNvSpPr>
+            <a:spLocks noGrp="1"/>
+          </p:cNvSpPr>
+          <p:nvPr>
+            <p:ph idx="1"/>
+          </p:nvPr>
+        </p:nvSpPr>
+        <p:spPr/>
+        <p:txBody>
+          <a:bodyPr/>
+          <a:lstStyle/>
+          <a:p>
+            <a:r>
+              <a:rPr lang="en-US" dirty="0"/>
+              <a:t>In the ColdFusion world, there are a few ways to create these API endpoints :</a:t>
+            </a:r>
+          </a:p>
+          <a:p>
+            <a:endParaRPr lang="en-US" dirty="0"/>
+          </a:p>
+          <a:p>
+            <a:pPr lvl="1"/>
+            <a:r>
+              <a:rPr lang="en-US" dirty="0"/>
+              <a:t>Creating REST CFCs in ACF/</a:t>
+            </a:r>
+            <a:r>
+              <a:rPr lang="en-US" dirty="0" err="1"/>
+              <a:t>Lucee</a:t>
+            </a:r>
+            <a:r>
+              <a:rPr lang="en-US" dirty="0"/>
+              <a:t> to process data.</a:t>
+            </a:r>
+          </a:p>
+          <a:p>
+            <a:pPr lvl="2"/>
+            <a:r>
+              <a:rPr lang="en-US" dirty="0"/>
+              <a:t>Raw functionality.  You will need to own your own auth, rate limiting, etc.</a:t>
+            </a:r>
+          </a:p>
+          <a:p>
+            <a:pPr lvl="1"/>
+            <a:r>
+              <a:rPr lang="en-US" dirty="0"/>
+              <a:t>Using a framework like Taffy.io to develop your APIs</a:t>
+            </a:r>
+          </a:p>
+          <a:p>
+            <a:pPr lvl="2"/>
+            <a:r>
+              <a:rPr lang="en-US" dirty="0"/>
+              <a:t>Adds a ton of features using code.  </a:t>
+            </a:r>
+          </a:p>
+          <a:p>
+            <a:pPr lvl="1"/>
+            <a:r>
+              <a:rPr lang="en-US" dirty="0"/>
+              <a:t>Using the Adobe ColdFusion API Manager</a:t>
+            </a:r>
+          </a:p>
+          <a:p>
+            <a:pPr lvl="2"/>
+            <a:r>
+              <a:rPr lang="en-US" dirty="0"/>
+              <a:t>Bolt-on product from Adobe that helps implement a ton of features using a Web UI</a:t>
+            </a:r>
+          </a:p>
+          <a:p>
+            <a:pPr lvl="2"/>
+            <a:r>
+              <a:rPr lang="en-US" dirty="0"/>
+              <a:t>Gives access to authentication, analytics, rate limiting, auto-documentation, etc.</a:t>
+            </a:r>
+          </a:p>
+        </p:txBody>
+      </p:sp>
+    </p:spTree>
+    <p:extLst>
+      <p:ext uri="{BB962C8B-B14F-4D97-AF65-F5344CB8AC3E}">
+        <p14:creationId xmlns:p14="http://schemas.microsoft.com/office/powerpoint/2010/main" val="3910170193"/>
+      </p:ext>
+    </p:extLst>
+  </p:cSld>
+  <p:clrMapOvr>
+    <a:masterClrMapping/>
+  </p:clrMapOvr>
+</p:sld>
+</file>
+
+<file path=ppt/slides/slide17.xml><?xml version="1.0" encoding="utf-8"?>
+<p:sld xmlns:a="http://schemas.openxmlformats.org/drawingml/2006/main" xmlns:r="http://schemas.openxmlformats.org/officeDocument/2006/relationships" xmlns:p="http://schemas.openxmlformats.org/presentationml/2006/main">
+  <p:cSld>
+    <p:spTree>
+      <p:nvGrpSpPr>
+        <p:cNvPr id="1" name=""/>
+        <p:cNvGrpSpPr/>
+        <p:nvPr/>
+      </p:nvGrpSpPr>
+      <p:grpSpPr>
+        <a:xfrm>
+          <a:off x="0" y="0"/>
+          <a:ext cx="0" cy="0"/>
+          <a:chOff x="0" y="0"/>
+          <a:chExt cx="0" cy="0"/>
+        </a:xfrm>
+      </p:grpSpPr>
+      <p:sp>
+        <p:nvSpPr>
+          <p:cNvPr id="2" name="Title 1">
+            <a:extLst>
+              <a:ext uri="{FF2B5EF4-FFF2-40B4-BE49-F238E27FC236}">
+                <a16:creationId xmlns:a16="http://schemas.microsoft.com/office/drawing/2014/main" id="{B4BEE435-2C31-982A-AFB1-21754A447B89}"/>
+              </a:ext>
+            </a:extLst>
+          </p:cNvPr>
+          <p:cNvSpPr>
+            <a:spLocks noGrp="1"/>
+          </p:cNvSpPr>
+          <p:nvPr>
+            <p:ph type="title"/>
+          </p:nvPr>
+        </p:nvSpPr>
+        <p:spPr/>
+        <p:txBody>
+          <a:bodyPr/>
+          <a:lstStyle/>
+          <a:p>
+            <a:r>
+              <a:rPr lang="en-US" dirty="0"/>
+              <a:t>REST</a:t>
+            </a:r>
+          </a:p>
+        </p:txBody>
+      </p:sp>
+      <p:sp>
+        <p:nvSpPr>
+          <p:cNvPr id="3" name="Content Placeholder 2">
+            <a:extLst>
+              <a:ext uri="{FF2B5EF4-FFF2-40B4-BE49-F238E27FC236}">
+                <a16:creationId xmlns:a16="http://schemas.microsoft.com/office/drawing/2014/main" id="{4EBF1DCE-9302-5595-8535-FEA64D18126E}"/>
+              </a:ext>
+            </a:extLst>
+          </p:cNvPr>
+          <p:cNvSpPr>
+            <a:spLocks noGrp="1"/>
+          </p:cNvSpPr>
+          <p:nvPr>
+            <p:ph idx="1"/>
+          </p:nvPr>
+        </p:nvSpPr>
+        <p:spPr/>
+        <p:txBody>
+          <a:bodyPr/>
+          <a:lstStyle/>
+          <a:p>
+            <a:r>
+              <a:rPr lang="en-US" dirty="0"/>
+              <a:t>In the ColdFusion world, there are a few ways to create these API endpoints :</a:t>
+            </a:r>
+          </a:p>
+          <a:p>
+            <a:endParaRPr lang="en-US" dirty="0"/>
+          </a:p>
+          <a:p>
+            <a:pPr lvl="1"/>
+            <a:r>
+              <a:rPr lang="en-US" b="1" dirty="0">
+                <a:solidFill>
+                  <a:srgbClr val="FF0000"/>
+                </a:solidFill>
+              </a:rPr>
+              <a:t>Creating REST CFCs in ACF/</a:t>
+            </a:r>
+            <a:r>
+              <a:rPr lang="en-US" b="1" dirty="0" err="1">
+                <a:solidFill>
+                  <a:srgbClr val="FF0000"/>
+                </a:solidFill>
+              </a:rPr>
+              <a:t>Lucee</a:t>
+            </a:r>
+            <a:r>
+              <a:rPr lang="en-US" b="1" dirty="0">
+                <a:solidFill>
+                  <a:srgbClr val="FF0000"/>
+                </a:solidFill>
+              </a:rPr>
+              <a:t> to process data.</a:t>
+            </a:r>
+          </a:p>
+          <a:p>
+            <a:pPr lvl="2"/>
+            <a:r>
+              <a:rPr lang="en-US" dirty="0"/>
+              <a:t>Raw functionality.  You will need to own your own auth, rate limiting, etc.</a:t>
+            </a:r>
+          </a:p>
+          <a:p>
+            <a:pPr lvl="1"/>
+            <a:r>
+              <a:rPr lang="en-US" dirty="0"/>
+              <a:t>Using a framework like Taffy.io to develop your APIs</a:t>
+            </a:r>
+          </a:p>
+          <a:p>
+            <a:pPr lvl="2"/>
+            <a:r>
+              <a:rPr lang="en-US" dirty="0"/>
+              <a:t>Adds a ton of features using code.  </a:t>
+            </a:r>
+          </a:p>
+          <a:p>
+            <a:pPr lvl="1"/>
+            <a:r>
+              <a:rPr lang="en-US" dirty="0"/>
+              <a:t>Using the Adobe ColdFusion API Manager</a:t>
+            </a:r>
+          </a:p>
+          <a:p>
+            <a:pPr lvl="2"/>
+            <a:r>
+              <a:rPr lang="en-US" dirty="0"/>
+              <a:t>Bolt-on product from Adobe that helps implement a ton of features using a Web UI</a:t>
+            </a:r>
+          </a:p>
+          <a:p>
+            <a:pPr lvl="2"/>
+            <a:r>
+              <a:rPr lang="en-US" dirty="0"/>
+              <a:t>Gives access to authentication, analytics, rate limiting, auto-documentation, etc.</a:t>
+            </a:r>
+          </a:p>
+          <a:p>
+            <a:pPr lvl="2"/>
+            <a:endParaRPr lang="en-US" dirty="0"/>
+          </a:p>
+        </p:txBody>
+      </p:sp>
+    </p:spTree>
+    <p:extLst>
+      <p:ext uri="{BB962C8B-B14F-4D97-AF65-F5344CB8AC3E}">
+        <p14:creationId xmlns:p14="http://schemas.microsoft.com/office/powerpoint/2010/main" val="4163620947"/>
+      </p:ext>
+    </p:extLst>
+  </p:cSld>
+  <p:clrMapOvr>
+    <a:masterClrMapping/>
+  </p:clrMapOvr>
+</p:sld>
+</file>
+
+<file path=ppt/slides/slide18.xml><?xml version="1.0" encoding="utf-8"?>
+<p:sld xmlns:a="http://schemas.openxmlformats.org/drawingml/2006/main" xmlns:r="http://schemas.openxmlformats.org/officeDocument/2006/relationships" xmlns:p="http://schemas.openxmlformats.org/presentationml/2006/main">
+  <p:cSld>
+    <p:spTree>
+      <p:nvGrpSpPr>
+        <p:cNvPr id="1" name=""/>
+        <p:cNvGrpSpPr/>
+        <p:nvPr/>
+      </p:nvGrpSpPr>
+      <p:grpSpPr>
+        <a:xfrm>
+          <a:off x="0" y="0"/>
+          <a:ext cx="0" cy="0"/>
+          <a:chOff x="0" y="0"/>
+          <a:chExt cx="0" cy="0"/>
+        </a:xfrm>
+      </p:grpSpPr>
+      <p:sp>
+        <p:nvSpPr>
+          <p:cNvPr id="2" name="Title 1">
+            <a:extLst>
+              <a:ext uri="{FF2B5EF4-FFF2-40B4-BE49-F238E27FC236}">
+                <a16:creationId xmlns:a16="http://schemas.microsoft.com/office/drawing/2014/main" id="{E79531E2-E51B-0BCC-FDC6-F45B56582D0D}"/>
+              </a:ext>
+            </a:extLst>
+          </p:cNvPr>
+          <p:cNvSpPr>
+            <a:spLocks noGrp="1"/>
+          </p:cNvSpPr>
+          <p:nvPr>
+            <p:ph type="title"/>
+          </p:nvPr>
+        </p:nvSpPr>
+        <p:spPr/>
+        <p:txBody>
+          <a:bodyPr/>
+          <a:lstStyle/>
+          <a:p>
+            <a:r>
+              <a:rPr lang="en-US" dirty="0"/>
+              <a:t>REST</a:t>
+            </a:r>
+          </a:p>
+        </p:txBody>
+      </p:sp>
+      <p:sp>
+        <p:nvSpPr>
+          <p:cNvPr id="3" name="Content Placeholder 2">
+            <a:extLst>
+              <a:ext uri="{FF2B5EF4-FFF2-40B4-BE49-F238E27FC236}">
+                <a16:creationId xmlns:a16="http://schemas.microsoft.com/office/drawing/2014/main" id="{836E2FCB-47B2-46ED-7E3C-9FB70D262F99}"/>
+              </a:ext>
+            </a:extLst>
+          </p:cNvPr>
+          <p:cNvSpPr>
+            <a:spLocks noGrp="1"/>
+          </p:cNvSpPr>
+          <p:nvPr>
+            <p:ph idx="1"/>
+          </p:nvPr>
+        </p:nvSpPr>
+        <p:spPr/>
+        <p:txBody>
+          <a:bodyPr/>
+          <a:lstStyle/>
+          <a:p>
+            <a:r>
+              <a:rPr lang="en-US" dirty="0"/>
+              <a:t>Exploring what REST communications look like :</a:t>
+            </a:r>
+          </a:p>
+          <a:p>
+            <a:pPr lvl="1"/>
+            <a:r>
+              <a:rPr lang="en-US" dirty="0">
+                <a:hlinkClick r:id="rId2"/>
+              </a:rPr>
+              <a:t>https://localhost/demo1/</a:t>
+            </a:r>
+            <a:endParaRPr lang="en-US" dirty="0"/>
+          </a:p>
+          <a:p>
+            <a:pPr lvl="1"/>
+            <a:endParaRPr lang="en-US" dirty="0"/>
+          </a:p>
+          <a:p>
+            <a:endParaRPr lang="en-US" dirty="0"/>
+          </a:p>
+        </p:txBody>
+      </p:sp>
+    </p:spTree>
+    <p:extLst>
+      <p:ext uri="{BB962C8B-B14F-4D97-AF65-F5344CB8AC3E}">
+        <p14:creationId xmlns:p14="http://schemas.microsoft.com/office/powerpoint/2010/main" val="4190369622"/>
+      </p:ext>
+    </p:extLst>
+  </p:cSld>
+  <p:clrMapOvr>
+    <a:masterClrMapping/>
+  </p:clrMapOvr>
+</p:sld>
+</file>
+
+<file path=ppt/slides/slide19.xml><?xml version="1.0" encoding="utf-8"?>
+<p:sld xmlns:a="http://schemas.openxmlformats.org/drawingml/2006/main" xmlns:r="http://schemas.openxmlformats.org/officeDocument/2006/relationships" xmlns:p="http://schemas.openxmlformats.org/presentationml/2006/main">
+  <p:cSld>
+    <p:spTree>
+      <p:nvGrpSpPr>
+        <p:cNvPr id="1" name=""/>
+        <p:cNvGrpSpPr/>
+        <p:nvPr/>
+      </p:nvGrpSpPr>
+      <p:grpSpPr>
+        <a:xfrm>
+          <a:off x="0" y="0"/>
+          <a:ext cx="0" cy="0"/>
+          <a:chOff x="0" y="0"/>
+          <a:chExt cx="0" cy="0"/>
+        </a:xfrm>
+      </p:grpSpPr>
+      <p:sp>
+        <p:nvSpPr>
+          <p:cNvPr id="4" name="Title 3">
+            <a:extLst>
+              <a:ext uri="{FF2B5EF4-FFF2-40B4-BE49-F238E27FC236}">
                 <a16:creationId xmlns:a16="http://schemas.microsoft.com/office/drawing/2014/main" id="{95A857AB-03BC-9915-7979-78A35A0B1ABB}"/>
               </a:ext>
             </a:extLst>
@@ -3678,7 +4095,145 @@
 </p:sld>
 </file>
 
-<file path=ppt/slides/slide16.xml><?xml version="1.0" encoding="utf-8"?>
+<file path=ppt/slides/slide2.xml><?xml version="1.0" encoding="utf-8"?>
+<p:sld xmlns:a="http://schemas.openxmlformats.org/drawingml/2006/main" xmlns:r="http://schemas.openxmlformats.org/officeDocument/2006/relationships" xmlns:p="http://schemas.openxmlformats.org/presentationml/2006/main">
+  <p:cSld>
+    <p:spTree>
+      <p:nvGrpSpPr>
+        <p:cNvPr id="1" name=""/>
+        <p:cNvGrpSpPr/>
+        <p:nvPr/>
+      </p:nvGrpSpPr>
+      <p:grpSpPr>
+        <a:xfrm>
+          <a:off x="0" y="0"/>
+          <a:ext cx="0" cy="0"/>
+          <a:chOff x="0" y="0"/>
+          <a:chExt cx="0" cy="0"/>
+        </a:xfrm>
+      </p:grpSpPr>
+      <p:sp>
+        <p:nvSpPr>
+          <p:cNvPr id="2" name="Title 1">
+            <a:extLst>
+              <a:ext uri="{FF2B5EF4-FFF2-40B4-BE49-F238E27FC236}">
+                <a16:creationId xmlns:a16="http://schemas.microsoft.com/office/drawing/2014/main" id="{F03EB6AA-1CDC-4828-866D-C55C85CDC37A}"/>
+              </a:ext>
+            </a:extLst>
+          </p:cNvPr>
+          <p:cNvSpPr>
+            <a:spLocks noGrp="1"/>
+          </p:cNvSpPr>
+          <p:nvPr>
+            <p:ph type="title"/>
+          </p:nvPr>
+        </p:nvSpPr>
+        <p:spPr/>
+        <p:txBody>
+          <a:bodyPr/>
+          <a:lstStyle/>
+          <a:p>
+            <a:r>
+              <a:rPr lang="en-US" dirty="0"/>
+              <a:t>Welcome!</a:t>
+            </a:r>
+          </a:p>
+        </p:txBody>
+      </p:sp>
+      <p:sp>
+        <p:nvSpPr>
+          <p:cNvPr id="3" name="Content Placeholder 2">
+            <a:extLst>
+              <a:ext uri="{FF2B5EF4-FFF2-40B4-BE49-F238E27FC236}">
+                <a16:creationId xmlns:a16="http://schemas.microsoft.com/office/drawing/2014/main" id="{691C0B45-76AA-4561-B980-195C1581582C}"/>
+              </a:ext>
+            </a:extLst>
+          </p:cNvPr>
+          <p:cNvSpPr>
+            <a:spLocks noGrp="1"/>
+          </p:cNvSpPr>
+          <p:nvPr>
+            <p:ph idx="1"/>
+          </p:nvPr>
+        </p:nvSpPr>
+        <p:spPr/>
+        <p:txBody>
+          <a:bodyPr>
+            <a:normAutofit lnSpcReduction="10000"/>
+          </a:bodyPr>
+          <a:lstStyle/>
+          <a:p>
+            <a:r>
+              <a:rPr lang="en-US" dirty="0"/>
+              <a:t>Slides, examples and docker images can be found at :</a:t>
+            </a:r>
+          </a:p>
+          <a:p>
+            <a:pPr lvl="1"/>
+            <a:r>
+              <a:rPr lang="en-US" dirty="0">
+                <a:hlinkClick r:id="rId2"/>
+              </a:rPr>
+              <a:t>https://github.com/quetwo/hawaii-apis</a:t>
+            </a:r>
+            <a:r>
+              <a:rPr lang="en-US" dirty="0"/>
+              <a:t> </a:t>
+            </a:r>
+          </a:p>
+          <a:p>
+            <a:pPr lvl="1"/>
+            <a:r>
+              <a:rPr lang="en-US" dirty="0"/>
+              <a:t>Take a look at the README for instructions on getting started.  You have a few minutes while we talk about the basics.</a:t>
+            </a:r>
+          </a:p>
+          <a:p>
+            <a:pPr lvl="1"/>
+            <a:endParaRPr lang="en-US" dirty="0"/>
+          </a:p>
+          <a:p>
+            <a:r>
+              <a:rPr lang="en-US" dirty="0"/>
+              <a:t>This presentation assumes you have a passing knowledge of CFCs and basic CFML.   We will be using the </a:t>
+            </a:r>
+            <a:r>
+              <a:rPr lang="en-US" dirty="0" err="1"/>
+              <a:t>Lucee</a:t>
+            </a:r>
+            <a:r>
+              <a:rPr lang="en-US" dirty="0"/>
+              <a:t> engine and MySQL for our demos, but Adobe CF (version 9.1 and later) and other SQL engines will be nearly identical.</a:t>
+            </a:r>
+          </a:p>
+          <a:p>
+            <a:endParaRPr lang="en-US" dirty="0"/>
+          </a:p>
+          <a:p>
+            <a:r>
+              <a:rPr lang="en-US" dirty="0"/>
+              <a:t>This meeting will be recorded.  </a:t>
+            </a:r>
+          </a:p>
+          <a:p>
+            <a:endParaRPr lang="en-US" dirty="0"/>
+          </a:p>
+        </p:txBody>
+      </p:sp>
+    </p:spTree>
+    <p:extLst>
+      <p:ext uri="{BB962C8B-B14F-4D97-AF65-F5344CB8AC3E}">
+        <p14:creationId xmlns:p14="http://schemas.microsoft.com/office/powerpoint/2010/main" val="3285768562"/>
+      </p:ext>
+    </p:extLst>
+  </p:cSld>
+  <p:clrMapOvr>
+    <a:masterClrMapping/>
+  </p:clrMapOvr>
+</p:sld>
+</file>
+
+<file path=ppt/slides/slide20.xml><?xml version="1.0" encoding="utf-8"?>
 <p:sld xmlns:a="http://schemas.openxmlformats.org/drawingml/2006/main" xmlns:r="http://schemas.openxmlformats.org/officeDocument/2006/relationships" xmlns:p="http://schemas.openxmlformats.org/presentationml/2006/main">
   <p:cSld>
     <p:spTree>
@@ -3827,7 +4382,7 @@
 </p:sld>
 </file>
 
-<file path=ppt/slides/slide17.xml><?xml version="1.0" encoding="utf-8"?>
+<file path=ppt/slides/slide21.xml><?xml version="1.0" encoding="utf-8"?>
 <p:sld xmlns:a="http://schemas.openxmlformats.org/drawingml/2006/main" xmlns:r="http://schemas.openxmlformats.org/officeDocument/2006/relationships" xmlns:p="http://schemas.openxmlformats.org/presentationml/2006/main">
   <p:cSld>
     <p:spTree>
@@ -3979,7 +4534,7 @@
 </p:sld>
 </file>
 
-<file path=ppt/slides/slide18.xml><?xml version="1.0" encoding="utf-8"?>
+<file path=ppt/slides/slide22.xml><?xml version="1.0" encoding="utf-8"?>
 <p:sld xmlns:a="http://schemas.openxmlformats.org/drawingml/2006/main" xmlns:r="http://schemas.openxmlformats.org/officeDocument/2006/relationships" xmlns:p="http://schemas.openxmlformats.org/presentationml/2006/main">
   <p:cSld>
     <p:spTree>
@@ -4136,7 +4691,7 @@
 </p:sld>
 </file>
 
-<file path=ppt/slides/slide19.xml><?xml version="1.0" encoding="utf-8"?>
+<file path=ppt/slides/slide23.xml><?xml version="1.0" encoding="utf-8"?>
 <p:sld xmlns:a="http://schemas.openxmlformats.org/drawingml/2006/main" xmlns:r="http://schemas.openxmlformats.org/officeDocument/2006/relationships" xmlns:p="http://schemas.openxmlformats.org/presentationml/2006/main">
   <p:cSld>
     <p:spTree>
@@ -4281,145 +4836,7 @@
 </p:sld>
 </file>
 
-<file path=ppt/slides/slide2.xml><?xml version="1.0" encoding="utf-8"?>
-<p:sld xmlns:a="http://schemas.openxmlformats.org/drawingml/2006/main" xmlns:r="http://schemas.openxmlformats.org/officeDocument/2006/relationships" xmlns:p="http://schemas.openxmlformats.org/presentationml/2006/main">
-  <p:cSld>
-    <p:spTree>
-      <p:nvGrpSpPr>
-        <p:cNvPr id="1" name=""/>
-        <p:cNvGrpSpPr/>
-        <p:nvPr/>
-      </p:nvGrpSpPr>
-      <p:grpSpPr>
-        <a:xfrm>
-          <a:off x="0" y="0"/>
-          <a:ext cx="0" cy="0"/>
-          <a:chOff x="0" y="0"/>
-          <a:chExt cx="0" cy="0"/>
-        </a:xfrm>
-      </p:grpSpPr>
-      <p:sp>
-        <p:nvSpPr>
-          <p:cNvPr id="2" name="Title 1">
-            <a:extLst>
-              <a:ext uri="{FF2B5EF4-FFF2-40B4-BE49-F238E27FC236}">
-                <a16:creationId xmlns:a16="http://schemas.microsoft.com/office/drawing/2014/main" id="{F03EB6AA-1CDC-4828-866D-C55C85CDC37A}"/>
-              </a:ext>
-            </a:extLst>
-          </p:cNvPr>
-          <p:cNvSpPr>
-            <a:spLocks noGrp="1"/>
-          </p:cNvSpPr>
-          <p:nvPr>
-            <p:ph type="title"/>
-          </p:nvPr>
-        </p:nvSpPr>
-        <p:spPr/>
-        <p:txBody>
-          <a:bodyPr/>
-          <a:lstStyle/>
-          <a:p>
-            <a:r>
-              <a:rPr lang="en-US" dirty="0"/>
-              <a:t>Welcome!</a:t>
-            </a:r>
-          </a:p>
-        </p:txBody>
-      </p:sp>
-      <p:sp>
-        <p:nvSpPr>
-          <p:cNvPr id="3" name="Content Placeholder 2">
-            <a:extLst>
-              <a:ext uri="{FF2B5EF4-FFF2-40B4-BE49-F238E27FC236}">
-                <a16:creationId xmlns:a16="http://schemas.microsoft.com/office/drawing/2014/main" id="{691C0B45-76AA-4561-B980-195C1581582C}"/>
-              </a:ext>
-            </a:extLst>
-          </p:cNvPr>
-          <p:cNvSpPr>
-            <a:spLocks noGrp="1"/>
-          </p:cNvSpPr>
-          <p:nvPr>
-            <p:ph idx="1"/>
-          </p:nvPr>
-        </p:nvSpPr>
-        <p:spPr/>
-        <p:txBody>
-          <a:bodyPr>
-            <a:normAutofit lnSpcReduction="10000"/>
-          </a:bodyPr>
-          <a:lstStyle/>
-          <a:p>
-            <a:r>
-              <a:rPr lang="en-US" dirty="0"/>
-              <a:t>Slides, examples and docker images can be found at :</a:t>
-            </a:r>
-          </a:p>
-          <a:p>
-            <a:pPr lvl="1"/>
-            <a:r>
-              <a:rPr lang="en-US" dirty="0">
-                <a:hlinkClick r:id="rId2"/>
-              </a:rPr>
-              <a:t>https://github.com/quetwo/hawaii-apis</a:t>
-            </a:r>
-            <a:r>
-              <a:rPr lang="en-US" dirty="0"/>
-              <a:t> </a:t>
-            </a:r>
-          </a:p>
-          <a:p>
-            <a:pPr lvl="1"/>
-            <a:r>
-              <a:rPr lang="en-US" dirty="0"/>
-              <a:t>Take a look at the README for instructions on getting started.  You have a few minutes while we talk about the basics.</a:t>
-            </a:r>
-          </a:p>
-          <a:p>
-            <a:pPr lvl="1"/>
-            <a:endParaRPr lang="en-US" dirty="0"/>
-          </a:p>
-          <a:p>
-            <a:r>
-              <a:rPr lang="en-US" dirty="0"/>
-              <a:t>This presentation assumes you have a passing knowledge of CFCs and basic CFML.   We will be using the </a:t>
-            </a:r>
-            <a:r>
-              <a:rPr lang="en-US" dirty="0" err="1"/>
-              <a:t>Lucee</a:t>
-            </a:r>
-            <a:r>
-              <a:rPr lang="en-US" dirty="0"/>
-              <a:t> engine and MySQL for our demos, but Adobe CF (version 9.1 and later) and other SQL engines will be nearly identical.</a:t>
-            </a:r>
-          </a:p>
-          <a:p>
-            <a:endParaRPr lang="en-US" dirty="0"/>
-          </a:p>
-          <a:p>
-            <a:r>
-              <a:rPr lang="en-US" dirty="0"/>
-              <a:t>This meeting will be recorded.  </a:t>
-            </a:r>
-          </a:p>
-          <a:p>
-            <a:endParaRPr lang="en-US" dirty="0"/>
-          </a:p>
-        </p:txBody>
-      </p:sp>
-    </p:spTree>
-    <p:extLst>
-      <p:ext uri="{BB962C8B-B14F-4D97-AF65-F5344CB8AC3E}">
-        <p14:creationId xmlns:p14="http://schemas.microsoft.com/office/powerpoint/2010/main" val="3285768562"/>
-      </p:ext>
-    </p:extLst>
-  </p:cSld>
-  <p:clrMapOvr>
-    <a:masterClrMapping/>
-  </p:clrMapOvr>
-</p:sld>
-</file>
-
-<file path=ppt/slides/slide20.xml><?xml version="1.0" encoding="utf-8"?>
+<file path=ppt/slides/slide24.xml><?xml version="1.0" encoding="utf-8"?>
 <p:sld xmlns:a="http://schemas.openxmlformats.org/drawingml/2006/main" xmlns:r="http://schemas.openxmlformats.org/officeDocument/2006/relationships" xmlns:p="http://schemas.openxmlformats.org/presentationml/2006/main">
   <p:cSld>
     <p:spTree>
@@ -4535,7 +4952,7 @@
 </p:sld>
 </file>
 
-<file path=ppt/slides/slide21.xml><?xml version="1.0" encoding="utf-8"?>
+<file path=ppt/slides/slide25.xml><?xml version="1.0" encoding="utf-8"?>
 <p:sld xmlns:a="http://schemas.openxmlformats.org/drawingml/2006/main" xmlns:r="http://schemas.openxmlformats.org/officeDocument/2006/relationships" xmlns:p="http://schemas.openxmlformats.org/presentationml/2006/main">
   <p:cSld>
     <p:spTree>
@@ -4653,7 +5070,7 @@
 </p:sld>
 </file>
 
-<file path=ppt/slides/slide22.xml><?xml version="1.0" encoding="utf-8"?>
+<file path=ppt/slides/slide26.xml><?xml version="1.0" encoding="utf-8"?>
 <p:sld xmlns:a="http://schemas.openxmlformats.org/drawingml/2006/main" xmlns:r="http://schemas.openxmlformats.org/officeDocument/2006/relationships" xmlns:p="http://schemas.openxmlformats.org/presentationml/2006/main">
   <p:cSld>
     <p:spTree>
@@ -4795,7 +5212,7 @@
 </p:sld>
 </file>
 
-<file path=ppt/slides/slide23.xml><?xml version="1.0" encoding="utf-8"?>
+<file path=ppt/slides/slide27.xml><?xml version="1.0" encoding="utf-8"?>
 <p:sld xmlns:a="http://schemas.openxmlformats.org/drawingml/2006/main" xmlns:r="http://schemas.openxmlformats.org/officeDocument/2006/relationships" xmlns:p="http://schemas.openxmlformats.org/presentationml/2006/main">
   <p:cSld>
     <p:spTree>
@@ -4882,7 +5299,7 @@
 </p:sld>
 </file>
 
-<file path=ppt/slides/slide24.xml><?xml version="1.0" encoding="utf-8"?>
+<file path=ppt/slides/slide28.xml><?xml version="1.0" encoding="utf-8"?>
 <p:sld xmlns:a="http://schemas.openxmlformats.org/drawingml/2006/main" xmlns:r="http://schemas.openxmlformats.org/officeDocument/2006/relationships" xmlns:p="http://schemas.openxmlformats.org/presentationml/2006/main">
   <p:cSld>
     <p:spTree>
@@ -5001,7 +5418,7 @@
 </p:sld>
 </file>
 
-<file path=ppt/slides/slide25.xml><?xml version="1.0" encoding="utf-8"?>
+<file path=ppt/slides/slide29.xml><?xml version="1.0" encoding="utf-8"?>
 <p:sld xmlns:a="http://schemas.openxmlformats.org/drawingml/2006/main" xmlns:r="http://schemas.openxmlformats.org/officeDocument/2006/relationships" xmlns:p="http://schemas.openxmlformats.org/presentationml/2006/main">
   <p:cSld>
     <p:spTree>
@@ -5123,7 +5540,120 @@
 </p:sld>
 </file>
 
-<file path=ppt/slides/slide26.xml><?xml version="1.0" encoding="utf-8"?>
+<file path=ppt/slides/slide3.xml><?xml version="1.0" encoding="utf-8"?>
+<p:sld xmlns:a="http://schemas.openxmlformats.org/drawingml/2006/main" xmlns:r="http://schemas.openxmlformats.org/officeDocument/2006/relationships" xmlns:p="http://schemas.openxmlformats.org/presentationml/2006/main">
+  <p:cSld>
+    <p:spTree>
+      <p:nvGrpSpPr>
+        <p:cNvPr id="1" name=""/>
+        <p:cNvGrpSpPr/>
+        <p:nvPr/>
+      </p:nvGrpSpPr>
+      <p:grpSpPr>
+        <a:xfrm>
+          <a:off x="0" y="0"/>
+          <a:ext cx="0" cy="0"/>
+          <a:chOff x="0" y="0"/>
+          <a:chExt cx="0" cy="0"/>
+        </a:xfrm>
+      </p:grpSpPr>
+      <p:sp>
+        <p:nvSpPr>
+          <p:cNvPr id="2" name="Title 1">
+            <a:extLst>
+              <a:ext uri="{FF2B5EF4-FFF2-40B4-BE49-F238E27FC236}">
+                <a16:creationId xmlns:a16="http://schemas.microsoft.com/office/drawing/2014/main" id="{42EC7050-BC47-4D3A-8052-66D0B281666D}"/>
+              </a:ext>
+            </a:extLst>
+          </p:cNvPr>
+          <p:cNvSpPr>
+            <a:spLocks noGrp="1"/>
+          </p:cNvSpPr>
+          <p:nvPr>
+            <p:ph type="title"/>
+          </p:nvPr>
+        </p:nvSpPr>
+        <p:spPr/>
+        <p:txBody>
+          <a:bodyPr/>
+          <a:lstStyle/>
+          <a:p>
+            <a:r>
+              <a:rPr lang="en-US" dirty="0"/>
+              <a:t>About Nick</a:t>
+            </a:r>
+          </a:p>
+        </p:txBody>
+      </p:sp>
+      <p:sp>
+        <p:nvSpPr>
+          <p:cNvPr id="3" name="Content Placeholder 2">
+            <a:extLst>
+              <a:ext uri="{FF2B5EF4-FFF2-40B4-BE49-F238E27FC236}">
+                <a16:creationId xmlns:a16="http://schemas.microsoft.com/office/drawing/2014/main" id="{B608C4D2-5E63-4E3A-AC35-681C154CDAE6}"/>
+              </a:ext>
+            </a:extLst>
+          </p:cNvPr>
+          <p:cNvSpPr>
+            <a:spLocks noGrp="1"/>
+          </p:cNvSpPr>
+          <p:nvPr>
+            <p:ph idx="1"/>
+          </p:nvPr>
+        </p:nvSpPr>
+        <p:spPr/>
+        <p:txBody>
+          <a:bodyPr/>
+          <a:lstStyle/>
+          <a:p>
+            <a:r>
+              <a:rPr lang="en-US" dirty="0"/>
+              <a:t>CF programmer since the mid 90’s – started with CF 4.0.1</a:t>
+            </a:r>
+          </a:p>
+          <a:p>
+            <a:r>
+              <a:rPr lang="en-US" dirty="0"/>
+              <a:t>Member of the Apache Foundation, and a committer to a few projects</a:t>
+            </a:r>
+          </a:p>
+          <a:p>
+            <a:r>
+              <a:rPr lang="en-US" dirty="0"/>
+              <a:t>MMCFUG member and contributor</a:t>
+            </a:r>
+          </a:p>
+          <a:p>
+            <a:endParaRPr lang="en-US" dirty="0"/>
+          </a:p>
+          <a:p>
+            <a:r>
+              <a:rPr lang="en-US" dirty="0"/>
+              <a:t>Adjunct Professor at Michigan State University in the College of Communication Arts and Sciences</a:t>
+            </a:r>
+          </a:p>
+          <a:p>
+            <a:r>
+              <a:rPr lang="en-US" dirty="0"/>
+              <a:t>Manager of the Unified Communications Team at Michigan State University</a:t>
+            </a:r>
+          </a:p>
+        </p:txBody>
+      </p:sp>
+    </p:spTree>
+    <p:extLst>
+      <p:ext uri="{BB962C8B-B14F-4D97-AF65-F5344CB8AC3E}">
+        <p14:creationId xmlns:p14="http://schemas.microsoft.com/office/powerpoint/2010/main" val="1647056012"/>
+      </p:ext>
+    </p:extLst>
+  </p:cSld>
+  <p:clrMapOvr>
+    <a:masterClrMapping/>
+  </p:clrMapOvr>
+</p:sld>
+</file>
+
+<file path=ppt/slides/slide30.xml><?xml version="1.0" encoding="utf-8"?>
 <p:sld xmlns:a="http://schemas.openxmlformats.org/drawingml/2006/main" xmlns:r="http://schemas.openxmlformats.org/officeDocument/2006/relationships" xmlns:p="http://schemas.openxmlformats.org/presentationml/2006/main">
   <p:cSld>
     <p:spTree>
@@ -5211,7 +5741,7 @@
 </p:sld>
 </file>
 
-<file path=ppt/slides/slide27.xml><?xml version="1.0" encoding="utf-8"?>
+<file path=ppt/slides/slide31.xml><?xml version="1.0" encoding="utf-8"?>
 <p:sld xmlns:a="http://schemas.openxmlformats.org/drawingml/2006/main" xmlns:r="http://schemas.openxmlformats.org/officeDocument/2006/relationships" xmlns:p="http://schemas.openxmlformats.org/presentationml/2006/main">
   <p:cSld>
     <p:spTree>
@@ -5349,7 +5879,7 @@
 </p:sld>
 </file>
 
-<file path=ppt/slides/slide28.xml><?xml version="1.0" encoding="utf-8"?>
+<file path=ppt/slides/slide32.xml><?xml version="1.0" encoding="utf-8"?>
 <p:sld xmlns:a="http://schemas.openxmlformats.org/drawingml/2006/main" xmlns:r="http://schemas.openxmlformats.org/officeDocument/2006/relationships" xmlns:p="http://schemas.openxmlformats.org/presentationml/2006/main">
   <p:cSld>
     <p:spTree>
@@ -5436,7 +5966,7 @@
 </p:sld>
 </file>
 
-<file path=ppt/slides/slide29.xml><?xml version="1.0" encoding="utf-8"?>
+<file path=ppt/slides/slide33.xml><?xml version="1.0" encoding="utf-8"?>
 <p:sld xmlns:a="http://schemas.openxmlformats.org/drawingml/2006/main" xmlns:r="http://schemas.openxmlformats.org/officeDocument/2006/relationships" xmlns:p="http://schemas.openxmlformats.org/presentationml/2006/main">
   <p:cSld>
     <p:spTree>
@@ -5562,6 +6092,28 @@
           </a:p>
           <a:p>
             <a:pPr lvl="1"/>
+            <a:r>
+              <a:rPr lang="en-US" dirty="0"/>
+              <a:t>Good example </a:t>
+            </a:r>
+            <a:r>
+              <a:rPr lang="en-US"/>
+              <a:t>of using JWT’s here : </a:t>
+            </a:r>
+            <a:r>
+              <a:rPr lang="en-US">
+                <a:hlinkClick r:id="rId2"/>
+              </a:rPr>
+              <a:t>https://medium.com/analytics-vidhya/building-an-awesome-restful-apis-with-coldfusion-86422f6b2b6f</a:t>
+            </a:r>
+            <a:r>
+              <a:rPr lang="en-US"/>
+              <a:t> </a:t>
+            </a:r>
+            <a:endParaRPr lang="en-US" dirty="0"/>
+          </a:p>
+          <a:p>
+            <a:pPr lvl="1"/>
             <a:endParaRPr lang="en-US" dirty="0"/>
           </a:p>
           <a:p>
@@ -5583,120 +6135,7 @@
 </p:sld>
 </file>
 
-<file path=ppt/slides/slide3.xml><?xml version="1.0" encoding="utf-8"?>
-<p:sld xmlns:a="http://schemas.openxmlformats.org/drawingml/2006/main" xmlns:r="http://schemas.openxmlformats.org/officeDocument/2006/relationships" xmlns:p="http://schemas.openxmlformats.org/presentationml/2006/main">
-  <p:cSld>
-    <p:spTree>
-      <p:nvGrpSpPr>
-        <p:cNvPr id="1" name=""/>
-        <p:cNvGrpSpPr/>
-        <p:nvPr/>
-      </p:nvGrpSpPr>
-      <p:grpSpPr>
-        <a:xfrm>
-          <a:off x="0" y="0"/>
-          <a:ext cx="0" cy="0"/>
-          <a:chOff x="0" y="0"/>
-          <a:chExt cx="0" cy="0"/>
-        </a:xfrm>
-      </p:grpSpPr>
-      <p:sp>
-        <p:nvSpPr>
-          <p:cNvPr id="2" name="Title 1">
-            <a:extLst>
-              <a:ext uri="{FF2B5EF4-FFF2-40B4-BE49-F238E27FC236}">
-                <a16:creationId xmlns:a16="http://schemas.microsoft.com/office/drawing/2014/main" id="{42EC7050-BC47-4D3A-8052-66D0B281666D}"/>
-              </a:ext>
-            </a:extLst>
-          </p:cNvPr>
-          <p:cNvSpPr>
-            <a:spLocks noGrp="1"/>
-          </p:cNvSpPr>
-          <p:nvPr>
-            <p:ph type="title"/>
-          </p:nvPr>
-        </p:nvSpPr>
-        <p:spPr/>
-        <p:txBody>
-          <a:bodyPr/>
-          <a:lstStyle/>
-          <a:p>
-            <a:r>
-              <a:rPr lang="en-US" dirty="0"/>
-              <a:t>About Nick</a:t>
-            </a:r>
-          </a:p>
-        </p:txBody>
-      </p:sp>
-      <p:sp>
-        <p:nvSpPr>
-          <p:cNvPr id="3" name="Content Placeholder 2">
-            <a:extLst>
-              <a:ext uri="{FF2B5EF4-FFF2-40B4-BE49-F238E27FC236}">
-                <a16:creationId xmlns:a16="http://schemas.microsoft.com/office/drawing/2014/main" id="{B608C4D2-5E63-4E3A-AC35-681C154CDAE6}"/>
-              </a:ext>
-            </a:extLst>
-          </p:cNvPr>
-          <p:cNvSpPr>
-            <a:spLocks noGrp="1"/>
-          </p:cNvSpPr>
-          <p:nvPr>
-            <p:ph idx="1"/>
-          </p:nvPr>
-        </p:nvSpPr>
-        <p:spPr/>
-        <p:txBody>
-          <a:bodyPr/>
-          <a:lstStyle/>
-          <a:p>
-            <a:r>
-              <a:rPr lang="en-US" dirty="0"/>
-              <a:t>CF programmer since the mid 90’s – started with CF 4.0.1</a:t>
-            </a:r>
-          </a:p>
-          <a:p>
-            <a:r>
-              <a:rPr lang="en-US" dirty="0"/>
-              <a:t>Member of the Apache Foundation, and a committer to a few projects</a:t>
-            </a:r>
-          </a:p>
-          <a:p>
-            <a:r>
-              <a:rPr lang="en-US" dirty="0"/>
-              <a:t>MMCFUG member and contributor</a:t>
-            </a:r>
-          </a:p>
-          <a:p>
-            <a:endParaRPr lang="en-US" dirty="0"/>
-          </a:p>
-          <a:p>
-            <a:r>
-              <a:rPr lang="en-US" dirty="0"/>
-              <a:t>Adjunct Professor at Michigan State University in the College of Communication Arts and Sciences</a:t>
-            </a:r>
-          </a:p>
-          <a:p>
-            <a:r>
-              <a:rPr lang="en-US" dirty="0"/>
-              <a:t>Manager of the Unified Communications Team at Michigan State University</a:t>
-            </a:r>
-          </a:p>
-        </p:txBody>
-      </p:sp>
-    </p:spTree>
-    <p:extLst>
-      <p:ext uri="{BB962C8B-B14F-4D97-AF65-F5344CB8AC3E}">
-        <p14:creationId xmlns:p14="http://schemas.microsoft.com/office/powerpoint/2010/main" val="1647056012"/>
-      </p:ext>
-    </p:extLst>
-  </p:cSld>
-  <p:clrMapOvr>
-    <a:masterClrMapping/>
-  </p:clrMapOvr>
-</p:sld>
-</file>
-
-<file path=ppt/slides/slide30.xml><?xml version="1.0" encoding="utf-8"?>
+<file path=ppt/slides/slide34.xml><?xml version="1.0" encoding="utf-8"?>
 <p:sld xmlns:a="http://schemas.openxmlformats.org/drawingml/2006/main" xmlns:r="http://schemas.openxmlformats.org/officeDocument/2006/relationships" xmlns:p="http://schemas.openxmlformats.org/presentationml/2006/main">
   <p:cSld>
     <p:spTree>
@@ -5843,7 +6282,7 @@
 </p:sld>
 </file>
 
-<file path=ppt/slides/slide31.xml><?xml version="1.0" encoding="utf-8"?>
+<file path=ppt/slides/slide35.xml><?xml version="1.0" encoding="utf-8"?>
 <p:sld xmlns:a="http://schemas.openxmlformats.org/drawingml/2006/main" xmlns:r="http://schemas.openxmlformats.org/officeDocument/2006/relationships" xmlns:p="http://schemas.openxmlformats.org/presentationml/2006/main">
   <p:cSld>
     <p:spTree>

</xml_diff>